<commit_message>
Enhance PPT: theme, footer, and optional screenshots embedding
</commit_message>
<xml_diff>
--- a/simple-webapp-jenkins-ci-cd/project_presentation.pptx
+++ b/simple-webapp-jenkins-ci-cd/project_presentation.pptx
@@ -21,6 +21,8 @@
     <p:sldId id="269" r:id="rId21"/>
     <p:sldId id="270" r:id="rId22"/>
     <p:sldId id="271" r:id="rId23"/>
+    <p:sldId id="272" r:id="rId24"/>
+    <p:sldId id="273" r:id="rId25"/>
   </p:sldIdLst>
   <p:sldSz cx="9144000" cy="6858000" type="screen4x3"/>
   <p:notesSz cx="6858000" cy="9144000"/>
@@ -3656,6 +3658,14 @@
 <file path=ppt/slides/slide1.xml><?xml version="1.0" encoding="utf-8"?>
 <p:sld xmlns:a="http://schemas.openxmlformats.org/drawingml/2006/main" xmlns:p="http://schemas.openxmlformats.org/presentationml/2006/main" xmlns:r="http://schemas.openxmlformats.org/officeDocument/2006/relationships">
   <p:cSld>
+    <p:bg>
+      <p:bgPr>
+        <a:solidFill>
+          <a:srgbClr val="F8FAFC"/>
+        </a:solidFill>
+        <a:effectLst/>
+      </p:bgPr>
+    </p:bg>
     <p:spTree>
       <p:nvGrpSpPr>
         <p:cNvPr id="1" name=""/>
@@ -3678,6 +3688,13 @@
           <a:bodyPr/>
           <a:lstStyle/>
           <a:p>
+            <a:pPr>
+              <a:defRPr sz="3800" b="1">
+                <a:solidFill>
+                  <a:srgbClr val="1E293B"/>
+                </a:solidFill>
+              </a:defRPr>
+            </a:pPr>
             <a:r>
               <a:t>Jenkins CI/CD for a Static Web App — Case Study</a:t>
             </a:r>
@@ -3699,8 +3716,50 @@
           <a:bodyPr/>
           <a:lstStyle/>
           <a:p>
+            <a:pPr>
+              <a:defRPr sz="1800">
+                <a:solidFill>
+                  <a:srgbClr val="0F6CBD"/>
+                </a:solidFill>
+              </a:defRPr>
+            </a:pPr>
             <a:r>
               <a:t>End-to-end CI/CD with Docker deployment | Punith C | Nov 13, 2025</a:t>
+            </a:r>
+          </a:p>
+        </p:txBody>
+      </p:sp>
+      <p:sp>
+        <p:nvSpPr>
+          <p:cNvPr id="4" name="TextBox 3"/>
+          <p:cNvSpPr txBox="1"/>
+          <p:nvPr/>
+        </p:nvSpPr>
+        <p:spPr>
+          <a:xfrm>
+            <a:off x="457200" y="6217920"/>
+            <a:ext cx="8229600" cy="274320"/>
+          </a:xfrm>
+          <a:prstGeom prst="rect">
+            <a:avLst/>
+          </a:prstGeom>
+          <a:noFill/>
+        </p:spPr>
+        <p:txBody>
+          <a:bodyPr wrap="none">
+            <a:spAutoFit/>
+          </a:bodyPr>
+          <a:lstStyle/>
+          <a:p>
+            <a:pPr algn="r">
+              <a:defRPr sz="1000">
+                <a:solidFill>
+                  <a:srgbClr val="64748B"/>
+                </a:solidFill>
+              </a:defRPr>
+            </a:pPr>
+            <a:r>
+              <a:t>Punith C  |  Nov 13, 2025</a:t>
             </a:r>
           </a:p>
         </p:txBody>
@@ -3716,6 +3775,14 @@
 <file path=ppt/slides/slide10.xml><?xml version="1.0" encoding="utf-8"?>
 <p:sld xmlns:a="http://schemas.openxmlformats.org/drawingml/2006/main" xmlns:p="http://schemas.openxmlformats.org/presentationml/2006/main" xmlns:r="http://schemas.openxmlformats.org/officeDocument/2006/relationships">
   <p:cSld>
+    <p:bg>
+      <p:bgPr>
+        <a:solidFill>
+          <a:srgbClr val="F8FAFC"/>
+        </a:solidFill>
+        <a:effectLst/>
+      </p:bgPr>
+    </p:bg>
     <p:spTree>
       <p:nvGrpSpPr>
         <p:cNvPr id="1" name=""/>
@@ -3738,6 +3805,13 @@
           <a:bodyPr/>
           <a:lstStyle/>
           <a:p>
+            <a:pPr>
+              <a:defRPr sz="2800" b="1">
+                <a:solidFill>
+                  <a:srgbClr val="0F6CBD"/>
+                </a:solidFill>
+              </a:defRPr>
+            </a:pPr>
             <a:r>
               <a:t>Deployment Approach (Docker)</a:t>
             </a:r>
@@ -3760,7 +3834,11 @@
           <a:lstStyle/>
           <a:p>
             <a:pPr>
-              <a:defRPr sz="2000"/>
+              <a:defRPr sz="2000">
+                <a:solidFill>
+                  <a:srgbClr val="1E293B"/>
+                </a:solidFill>
+              </a:defRPr>
             </a:pPr>
             <a:r>
               <a:t>Build image: simple-webapp:latest</a:t>
@@ -3768,7 +3846,11 @@
           </a:p>
           <a:p>
             <a:pPr>
-              <a:defRPr sz="2000"/>
+              <a:defRPr sz="2000">
+                <a:solidFill>
+                  <a:srgbClr val="1E293B"/>
+                </a:solidFill>
+              </a:defRPr>
             </a:pPr>
             <a:r>
               <a:t>Container: simple-webapp-demo (8090→80)</a:t>
@@ -3776,7 +3858,11 @@
           </a:p>
           <a:p>
             <a:pPr>
-              <a:defRPr sz="2000"/>
+              <a:defRPr sz="2000">
+                <a:solidFill>
+                  <a:srgbClr val="1E293B"/>
+                </a:solidFill>
+              </a:defRPr>
             </a:pPr>
             <a:r>
               <a:t>Stop/remove old container automatically</a:t>
@@ -3784,10 +3870,49 @@
           </a:p>
           <a:p>
             <a:pPr>
-              <a:defRPr sz="2000"/>
+              <a:defRPr sz="2000">
+                <a:solidFill>
+                  <a:srgbClr val="1E293B"/>
+                </a:solidFill>
+              </a:defRPr>
             </a:pPr>
             <a:r>
               <a:t>Post actions verify container health and URL</a:t>
+            </a:r>
+          </a:p>
+        </p:txBody>
+      </p:sp>
+      <p:sp>
+        <p:nvSpPr>
+          <p:cNvPr id="4" name="TextBox 3"/>
+          <p:cNvSpPr txBox="1"/>
+          <p:nvPr/>
+        </p:nvSpPr>
+        <p:spPr>
+          <a:xfrm>
+            <a:off x="457200" y="6217920"/>
+            <a:ext cx="8229600" cy="274320"/>
+          </a:xfrm>
+          <a:prstGeom prst="rect">
+            <a:avLst/>
+          </a:prstGeom>
+          <a:noFill/>
+        </p:spPr>
+        <p:txBody>
+          <a:bodyPr wrap="none">
+            <a:spAutoFit/>
+          </a:bodyPr>
+          <a:lstStyle/>
+          <a:p>
+            <a:pPr algn="r">
+              <a:defRPr sz="1000">
+                <a:solidFill>
+                  <a:srgbClr val="64748B"/>
+                </a:solidFill>
+              </a:defRPr>
+            </a:pPr>
+            <a:r>
+              <a:t>Punith C  |  Nov 13, 2025</a:t>
             </a:r>
           </a:p>
         </p:txBody>
@@ -3803,6 +3928,14 @@
 <file path=ppt/slides/slide11.xml><?xml version="1.0" encoding="utf-8"?>
 <p:sld xmlns:a="http://schemas.openxmlformats.org/drawingml/2006/main" xmlns:p="http://schemas.openxmlformats.org/presentationml/2006/main" xmlns:r="http://schemas.openxmlformats.org/officeDocument/2006/relationships">
   <p:cSld>
+    <p:bg>
+      <p:bgPr>
+        <a:solidFill>
+          <a:srgbClr val="F8FAFC"/>
+        </a:solidFill>
+        <a:effectLst/>
+      </p:bgPr>
+    </p:bg>
     <p:spTree>
       <p:nvGrpSpPr>
         <p:cNvPr id="1" name=""/>
@@ -3825,6 +3958,13 @@
           <a:bodyPr/>
           <a:lstStyle/>
           <a:p>
+            <a:pPr>
+              <a:defRPr sz="2800" b="1">
+                <a:solidFill>
+                  <a:srgbClr val="0F6CBD"/>
+                </a:solidFill>
+              </a:defRPr>
+            </a:pPr>
             <a:r>
               <a:t>Results &amp; Metrics</a:t>
             </a:r>
@@ -3847,7 +3987,11 @@
           <a:lstStyle/>
           <a:p>
             <a:pPr>
-              <a:defRPr sz="2000"/>
+              <a:defRPr sz="2000">
+                <a:solidFill>
+                  <a:srgbClr val="1E293B"/>
+                </a:solidFill>
+              </a:defRPr>
             </a:pPr>
             <a:r>
               <a:t>Build #10: SUCCESS (4/4 stages), ~15s total</a:t>
@@ -3855,7 +3999,11 @@
           </a:p>
           <a:p>
             <a:pPr>
-              <a:defRPr sz="2000"/>
+              <a:defRPr sz="2000">
+                <a:solidFill>
+                  <a:srgbClr val="1E293B"/>
+                </a:solidFill>
+              </a:defRPr>
             </a:pPr>
             <a:r>
               <a:t>Image ID: e54b76dbdf5f; Container ID: 1db05a33b511</a:t>
@@ -3863,7 +4011,11 @@
           </a:p>
           <a:p>
             <a:pPr>
-              <a:defRPr sz="2000"/>
+              <a:defRPr sz="2000">
+                <a:solidFill>
+                  <a:srgbClr val="1E293B"/>
+                </a:solidFill>
+              </a:defRPr>
             </a:pPr>
             <a:r>
               <a:t>URL: http://localhost:8090</a:t>
@@ -3871,10 +4023,49 @@
           </a:p>
           <a:p>
             <a:pPr>
-              <a:defRPr sz="2000"/>
+              <a:defRPr sz="2000">
+                <a:solidFill>
+                  <a:srgbClr val="1E293B"/>
+                </a:solidFill>
+              </a:defRPr>
             </a:pPr>
             <a:r>
               <a:t>JS alert verified: ‘Hello from the Simple WebApp Jenkins CI/CD demo!’</a:t>
+            </a:r>
+          </a:p>
+        </p:txBody>
+      </p:sp>
+      <p:sp>
+        <p:nvSpPr>
+          <p:cNvPr id="4" name="TextBox 3"/>
+          <p:cNvSpPr txBox="1"/>
+          <p:nvPr/>
+        </p:nvSpPr>
+        <p:spPr>
+          <a:xfrm>
+            <a:off x="457200" y="6217920"/>
+            <a:ext cx="8229600" cy="274320"/>
+          </a:xfrm>
+          <a:prstGeom prst="rect">
+            <a:avLst/>
+          </a:prstGeom>
+          <a:noFill/>
+        </p:spPr>
+        <p:txBody>
+          <a:bodyPr wrap="none">
+            <a:spAutoFit/>
+          </a:bodyPr>
+          <a:lstStyle/>
+          <a:p>
+            <a:pPr algn="r">
+              <a:defRPr sz="1000">
+                <a:solidFill>
+                  <a:srgbClr val="64748B"/>
+                </a:solidFill>
+              </a:defRPr>
+            </a:pPr>
+            <a:r>
+              <a:t>Punith C  |  Nov 13, 2025</a:t>
             </a:r>
           </a:p>
         </p:txBody>
@@ -3890,6 +4081,14 @@
 <file path=ppt/slides/slide12.xml><?xml version="1.0" encoding="utf-8"?>
 <p:sld xmlns:a="http://schemas.openxmlformats.org/drawingml/2006/main" xmlns:p="http://schemas.openxmlformats.org/presentationml/2006/main" xmlns:r="http://schemas.openxmlformats.org/officeDocument/2006/relationships">
   <p:cSld>
+    <p:bg>
+      <p:bgPr>
+        <a:solidFill>
+          <a:srgbClr val="F8FAFC"/>
+        </a:solidFill>
+        <a:effectLst/>
+      </p:bgPr>
+    </p:bg>
     <p:spTree>
       <p:nvGrpSpPr>
         <p:cNvPr id="1" name=""/>
@@ -3912,6 +4111,13 @@
           <a:bodyPr/>
           <a:lstStyle/>
           <a:p>
+            <a:pPr>
+              <a:defRPr sz="2800" b="1">
+                <a:solidFill>
+                  <a:srgbClr val="0F6CBD"/>
+                </a:solidFill>
+              </a:defRPr>
+            </a:pPr>
             <a:r>
               <a:t>Challenges &amp; Resolutions</a:t>
             </a:r>
@@ -3934,7 +4140,11 @@
           <a:lstStyle/>
           <a:p>
             <a:pPr>
-              <a:defRPr sz="2000"/>
+              <a:defRPr sz="2000">
+                <a:solidFill>
+                  <a:srgbClr val="1E293B"/>
+                </a:solidFill>
+              </a:defRPr>
             </a:pPr>
             <a:r>
               <a:t>Jenkinsfile path in nested dir → set Script Path + use dir()</a:t>
@@ -3942,7 +4152,11 @@
           </a:p>
           <a:p>
             <a:pPr>
-              <a:defRPr sz="2000"/>
+              <a:defRPr sz="2000">
+                <a:solidFill>
+                  <a:srgbClr val="1E293B"/>
+                </a:solidFill>
+              </a:defRPr>
             </a:pPr>
             <a:r>
               <a:t>Script permissions → git chmod + pipeline chmod</a:t>
@@ -3950,7 +4164,11 @@
           </a:p>
           <a:p>
             <a:pPr>
-              <a:defRPr sz="2000"/>
+              <a:defRPr sz="2000">
+                <a:solidFill>
+                  <a:srgbClr val="1E293B"/>
+                </a:solidFill>
+              </a:defRPr>
             </a:pPr>
             <a:r>
               <a:t>Docker permission denied → add Jenkins to docker group + restart</a:t>
@@ -3958,7 +4176,11 @@
           </a:p>
           <a:p>
             <a:pPr>
-              <a:defRPr sz="2000"/>
+              <a:defRPr sz="2000">
+                <a:solidFill>
+                  <a:srgbClr val="1E293B"/>
+                </a:solidFill>
+              </a:defRPr>
             </a:pPr>
             <a:r>
               <a:t>Image pull timeout → pre-cache nginx:alpine</a:t>
@@ -3966,10 +4188,49 @@
           </a:p>
           <a:p>
             <a:pPr>
-              <a:defRPr sz="2000"/>
+              <a:defRPr sz="2000">
+                <a:solidFill>
+                  <a:srgbClr val="1E293B"/>
+                </a:solidFill>
+              </a:defRPr>
             </a:pPr>
             <a:r>
               <a:t>Deploy method → switched from sudo copy to Docker</a:t>
+            </a:r>
+          </a:p>
+        </p:txBody>
+      </p:sp>
+      <p:sp>
+        <p:nvSpPr>
+          <p:cNvPr id="4" name="TextBox 3"/>
+          <p:cNvSpPr txBox="1"/>
+          <p:nvPr/>
+        </p:nvSpPr>
+        <p:spPr>
+          <a:xfrm>
+            <a:off x="457200" y="6217920"/>
+            <a:ext cx="8229600" cy="274320"/>
+          </a:xfrm>
+          <a:prstGeom prst="rect">
+            <a:avLst/>
+          </a:prstGeom>
+          <a:noFill/>
+        </p:spPr>
+        <p:txBody>
+          <a:bodyPr wrap="none">
+            <a:spAutoFit/>
+          </a:bodyPr>
+          <a:lstStyle/>
+          <a:p>
+            <a:pPr algn="r">
+              <a:defRPr sz="1000">
+                <a:solidFill>
+                  <a:srgbClr val="64748B"/>
+                </a:solidFill>
+              </a:defRPr>
+            </a:pPr>
+            <a:r>
+              <a:t>Punith C  |  Nov 13, 2025</a:t>
             </a:r>
           </a:p>
         </p:txBody>
@@ -3985,6 +4246,14 @@
 <file path=ppt/slides/slide13.xml><?xml version="1.0" encoding="utf-8"?>
 <p:sld xmlns:a="http://schemas.openxmlformats.org/drawingml/2006/main" xmlns:p="http://schemas.openxmlformats.org/presentationml/2006/main" xmlns:r="http://schemas.openxmlformats.org/officeDocument/2006/relationships">
   <p:cSld>
+    <p:bg>
+      <p:bgPr>
+        <a:solidFill>
+          <a:srgbClr val="F8FAFC"/>
+        </a:solidFill>
+        <a:effectLst/>
+      </p:bgPr>
+    </p:bg>
     <p:spTree>
       <p:nvGrpSpPr>
         <p:cNvPr id="1" name=""/>
@@ -4007,6 +4276,13 @@
           <a:bodyPr/>
           <a:lstStyle/>
           <a:p>
+            <a:pPr>
+              <a:defRPr sz="2800" b="1">
+                <a:solidFill>
+                  <a:srgbClr val="0F6CBD"/>
+                </a:solidFill>
+              </a:defRPr>
+            </a:pPr>
             <a:r>
               <a:t>Lessons Learned</a:t>
             </a:r>
@@ -4029,7 +4305,11 @@
           <a:lstStyle/>
           <a:p>
             <a:pPr>
-              <a:defRPr sz="2000"/>
+              <a:defRPr sz="2000">
+                <a:solidFill>
+                  <a:srgbClr val="1E293B"/>
+                </a:solidFill>
+              </a:defRPr>
             </a:pPr>
             <a:r>
               <a:t>Docker simplifies deployments in CI/CD</a:t>
@@ -4037,7 +4317,11 @@
           </a:p>
           <a:p>
             <a:pPr>
-              <a:defRPr sz="2000"/>
+              <a:defRPr sz="2000">
+                <a:solidFill>
+                  <a:srgbClr val="1E293B"/>
+                </a:solidFill>
+              </a:defRPr>
             </a:pPr>
             <a:r>
               <a:t>Repo structure impacts Jenkins configuration</a:t>
@@ -4045,7 +4329,11 @@
           </a:p>
           <a:p>
             <a:pPr>
-              <a:defRPr sz="2000"/>
+              <a:defRPr sz="2000">
+                <a:solidFill>
+                  <a:srgbClr val="1E293B"/>
+                </a:solidFill>
+              </a:defRPr>
             </a:pPr>
             <a:r>
               <a:t>Windows→Linux: scripts need executable bits</a:t>
@@ -4053,10 +4341,49 @@
           </a:p>
           <a:p>
             <a:pPr>
-              <a:defRPr sz="2000"/>
+              <a:defRPr sz="2000">
+                <a:solidFill>
+                  <a:srgbClr val="1E293B"/>
+                </a:solidFill>
+              </a:defRPr>
             </a:pPr>
             <a:r>
               <a:t>Group membership changes require service restart</a:t>
+            </a:r>
+          </a:p>
+        </p:txBody>
+      </p:sp>
+      <p:sp>
+        <p:nvSpPr>
+          <p:cNvPr id="4" name="TextBox 3"/>
+          <p:cNvSpPr txBox="1"/>
+          <p:nvPr/>
+        </p:nvSpPr>
+        <p:spPr>
+          <a:xfrm>
+            <a:off x="457200" y="6217920"/>
+            <a:ext cx="8229600" cy="274320"/>
+          </a:xfrm>
+          <a:prstGeom prst="rect">
+            <a:avLst/>
+          </a:prstGeom>
+          <a:noFill/>
+        </p:spPr>
+        <p:txBody>
+          <a:bodyPr wrap="none">
+            <a:spAutoFit/>
+          </a:bodyPr>
+          <a:lstStyle/>
+          <a:p>
+            <a:pPr algn="r">
+              <a:defRPr sz="1000">
+                <a:solidFill>
+                  <a:srgbClr val="64748B"/>
+                </a:solidFill>
+              </a:defRPr>
+            </a:pPr>
+            <a:r>
+              <a:t>Punith C  |  Nov 13, 2025</a:t>
             </a:r>
           </a:p>
         </p:txBody>
@@ -4072,6 +4399,14 @@
 <file path=ppt/slides/slide14.xml><?xml version="1.0" encoding="utf-8"?>
 <p:sld xmlns:a="http://schemas.openxmlformats.org/drawingml/2006/main" xmlns:p="http://schemas.openxmlformats.org/presentationml/2006/main" xmlns:r="http://schemas.openxmlformats.org/officeDocument/2006/relationships">
   <p:cSld>
+    <p:bg>
+      <p:bgPr>
+        <a:solidFill>
+          <a:srgbClr val="F8FAFC"/>
+        </a:solidFill>
+        <a:effectLst/>
+      </p:bgPr>
+    </p:bg>
     <p:spTree>
       <p:nvGrpSpPr>
         <p:cNvPr id="1" name=""/>
@@ -4094,6 +4429,13 @@
           <a:bodyPr/>
           <a:lstStyle/>
           <a:p>
+            <a:pPr>
+              <a:defRPr sz="2800" b="1">
+                <a:solidFill>
+                  <a:srgbClr val="0F6CBD"/>
+                </a:solidFill>
+              </a:defRPr>
+            </a:pPr>
             <a:r>
               <a:t>Next Steps (Enhancements)</a:t>
             </a:r>
@@ -4116,7 +4458,11 @@
           <a:lstStyle/>
           <a:p>
             <a:pPr>
-              <a:defRPr sz="2000"/>
+              <a:defRPr sz="2000">
+                <a:solidFill>
+                  <a:srgbClr val="1E293B"/>
+                </a:solidFill>
+              </a:defRPr>
             </a:pPr>
             <a:r>
               <a:t>UI tests with Playwright/Puppeteer</a:t>
@@ -4124,7 +4470,11 @@
           </a:p>
           <a:p>
             <a:pPr>
-              <a:defRPr sz="2000"/>
+              <a:defRPr sz="2000">
+                <a:solidFill>
+                  <a:srgbClr val="1E293B"/>
+                </a:solidFill>
+              </a:defRPr>
             </a:pPr>
             <a:r>
               <a:t>Push images to registry; tag by build number</a:t>
@@ -4132,7 +4482,11 @@
           </a:p>
           <a:p>
             <a:pPr>
-              <a:defRPr sz="2000"/>
+              <a:defRPr sz="2000">
+                <a:solidFill>
+                  <a:srgbClr val="1E293B"/>
+                </a:solidFill>
+              </a:defRPr>
             </a:pPr>
             <a:r>
               <a:t>Blue/green or canary deployments</a:t>
@@ -4140,10 +4494,49 @@
           </a:p>
           <a:p>
             <a:pPr>
-              <a:defRPr sz="2000"/>
+              <a:defRPr sz="2000">
+                <a:solidFill>
+                  <a:srgbClr val="1E293B"/>
+                </a:solidFill>
+              </a:defRPr>
             </a:pPr>
             <a:r>
               <a:t>Webhook triggers; Slack/Email notifications</a:t>
+            </a:r>
+          </a:p>
+        </p:txBody>
+      </p:sp>
+      <p:sp>
+        <p:nvSpPr>
+          <p:cNvPr id="4" name="TextBox 3"/>
+          <p:cNvSpPr txBox="1"/>
+          <p:nvPr/>
+        </p:nvSpPr>
+        <p:spPr>
+          <a:xfrm>
+            <a:off x="457200" y="6217920"/>
+            <a:ext cx="8229600" cy="274320"/>
+          </a:xfrm>
+          <a:prstGeom prst="rect">
+            <a:avLst/>
+          </a:prstGeom>
+          <a:noFill/>
+        </p:spPr>
+        <p:txBody>
+          <a:bodyPr wrap="none">
+            <a:spAutoFit/>
+          </a:bodyPr>
+          <a:lstStyle/>
+          <a:p>
+            <a:pPr algn="r">
+              <a:defRPr sz="1000">
+                <a:solidFill>
+                  <a:srgbClr val="64748B"/>
+                </a:solidFill>
+              </a:defRPr>
+            </a:pPr>
+            <a:r>
+              <a:t>Punith C  |  Nov 13, 2025</a:t>
             </a:r>
           </a:p>
         </p:txBody>
@@ -4159,6 +4552,14 @@
 <file path=ppt/slides/slide15.xml><?xml version="1.0" encoding="utf-8"?>
 <p:sld xmlns:a="http://schemas.openxmlformats.org/drawingml/2006/main" xmlns:p="http://schemas.openxmlformats.org/presentationml/2006/main" xmlns:r="http://schemas.openxmlformats.org/officeDocument/2006/relationships">
   <p:cSld>
+    <p:bg>
+      <p:bgPr>
+        <a:solidFill>
+          <a:srgbClr val="F8FAFC"/>
+        </a:solidFill>
+        <a:effectLst/>
+      </p:bgPr>
+    </p:bg>
     <p:spTree>
       <p:nvGrpSpPr>
         <p:cNvPr id="1" name=""/>
@@ -4181,8 +4582,15 @@
           <a:bodyPr/>
           <a:lstStyle/>
           <a:p>
-            <a:r>
-              <a:t>Screenshots (Replace placeholders)</a:t>
+            <a:pPr>
+              <a:defRPr sz="2800" b="1">
+                <a:solidFill>
+                  <a:srgbClr val="0F6CBD"/>
+                </a:solidFill>
+              </a:defRPr>
+            </a:pPr>
+            <a:r>
+              <a:t>Screenshot: Jenkins Build #10</a:t>
             </a:r>
           </a:p>
         </p:txBody>
@@ -4258,7 +4666,42 @@
               <a:defRPr sz="1600"/>
             </a:pPr>
             <a:r>
-              <a:t>1) Jenkins build #10 (4/4 green)  |  2) docker ps (8090→80)  |  3) Browser at http://localhost:8090</a:t>
+              <a:t>Place Jenkins build screenshot here (4/4 green stages)</a:t>
+            </a:r>
+          </a:p>
+        </p:txBody>
+      </p:sp>
+      <p:sp>
+        <p:nvSpPr>
+          <p:cNvPr id="5" name="TextBox 4"/>
+          <p:cNvSpPr txBox="1"/>
+          <p:nvPr/>
+        </p:nvSpPr>
+        <p:spPr>
+          <a:xfrm>
+            <a:off x="457200" y="6217920"/>
+            <a:ext cx="8229600" cy="274320"/>
+          </a:xfrm>
+          <a:prstGeom prst="rect">
+            <a:avLst/>
+          </a:prstGeom>
+          <a:noFill/>
+        </p:spPr>
+        <p:txBody>
+          <a:bodyPr wrap="none">
+            <a:spAutoFit/>
+          </a:bodyPr>
+          <a:lstStyle/>
+          <a:p>
+            <a:pPr algn="r">
+              <a:defRPr sz="1000">
+                <a:solidFill>
+                  <a:srgbClr val="64748B"/>
+                </a:solidFill>
+              </a:defRPr>
+            </a:pPr>
+            <a:r>
+              <a:t>Punith C  |  Nov 13, 2025</a:t>
             </a:r>
           </a:p>
         </p:txBody>
@@ -4274,6 +4717,14 @@
 <file path=ppt/slides/slide16.xml><?xml version="1.0" encoding="utf-8"?>
 <p:sld xmlns:a="http://schemas.openxmlformats.org/drawingml/2006/main" xmlns:p="http://schemas.openxmlformats.org/presentationml/2006/main" xmlns:r="http://schemas.openxmlformats.org/officeDocument/2006/relationships">
   <p:cSld>
+    <p:bg>
+      <p:bgPr>
+        <a:solidFill>
+          <a:srgbClr val="F8FAFC"/>
+        </a:solidFill>
+        <a:effectLst/>
+      </p:bgPr>
+    </p:bg>
     <p:spTree>
       <p:nvGrpSpPr>
         <p:cNvPr id="1" name=""/>
@@ -4296,6 +4747,343 @@
           <a:bodyPr/>
           <a:lstStyle/>
           <a:p>
+            <a:pPr>
+              <a:defRPr sz="2800" b="1">
+                <a:solidFill>
+                  <a:srgbClr val="0F6CBD"/>
+                </a:solidFill>
+              </a:defRPr>
+            </a:pPr>
+            <a:r>
+              <a:t>Screenshot: Docker Container (8090→80)</a:t>
+            </a:r>
+          </a:p>
+        </p:txBody>
+      </p:sp>
+      <p:sp>
+        <p:nvSpPr>
+          <p:cNvPr id="3" name="Rectangle 2"/>
+          <p:cNvSpPr/>
+          <p:nvPr/>
+        </p:nvSpPr>
+        <p:spPr>
+          <a:xfrm>
+            <a:off x="914400" y="1645920"/>
+            <a:ext cx="7315200" cy="3657600"/>
+          </a:xfrm>
+          <a:prstGeom prst="rect">
+            <a:avLst/>
+          </a:prstGeom>
+          <a:solidFill>
+            <a:srgbClr val="E6E6E6"/>
+          </a:solidFill>
+          <a:ln>
+            <a:solidFill>
+              <a:srgbClr val="787878"/>
+            </a:solidFill>
+          </a:ln>
+        </p:spPr>
+        <p:style>
+          <a:lnRef idx="1">
+            <a:schemeClr val="accent1"/>
+          </a:lnRef>
+          <a:fillRef idx="3">
+            <a:schemeClr val="accent1"/>
+          </a:fillRef>
+          <a:effectRef idx="2">
+            <a:schemeClr val="accent1"/>
+          </a:effectRef>
+          <a:fontRef idx="minor">
+            <a:schemeClr val="lt1"/>
+          </a:fontRef>
+        </p:style>
+        <p:txBody>
+          <a:bodyPr rtlCol="0" anchor="ctr"/>
+          <a:lstStyle/>
+          <a:p>
+            <a:pPr algn="ctr"/>
+          </a:p>
+        </p:txBody>
+      </p:sp>
+      <p:sp>
+        <p:nvSpPr>
+          <p:cNvPr id="4" name="TextBox 3"/>
+          <p:cNvSpPr txBox="1"/>
+          <p:nvPr/>
+        </p:nvSpPr>
+        <p:spPr>
+          <a:xfrm>
+            <a:off x="1097280" y="1828800"/>
+            <a:ext cx="6949440" cy="914400"/>
+          </a:xfrm>
+          <a:prstGeom prst="rect">
+            <a:avLst/>
+          </a:prstGeom>
+          <a:noFill/>
+        </p:spPr>
+        <p:txBody>
+          <a:bodyPr wrap="none">
+            <a:spAutoFit/>
+          </a:bodyPr>
+          <a:lstStyle/>
+          <a:p>
+            <a:pPr algn="ctr">
+              <a:defRPr sz="1600"/>
+            </a:pPr>
+            <a:r>
+              <a:t>Place 'docker ps' screenshot showing simple-webapp-demo here</a:t>
+            </a:r>
+          </a:p>
+        </p:txBody>
+      </p:sp>
+      <p:sp>
+        <p:nvSpPr>
+          <p:cNvPr id="5" name="TextBox 4"/>
+          <p:cNvSpPr txBox="1"/>
+          <p:nvPr/>
+        </p:nvSpPr>
+        <p:spPr>
+          <a:xfrm>
+            <a:off x="457200" y="6217920"/>
+            <a:ext cx="8229600" cy="274320"/>
+          </a:xfrm>
+          <a:prstGeom prst="rect">
+            <a:avLst/>
+          </a:prstGeom>
+          <a:noFill/>
+        </p:spPr>
+        <p:txBody>
+          <a:bodyPr wrap="none">
+            <a:spAutoFit/>
+          </a:bodyPr>
+          <a:lstStyle/>
+          <a:p>
+            <a:pPr algn="r">
+              <a:defRPr sz="1000">
+                <a:solidFill>
+                  <a:srgbClr val="64748B"/>
+                </a:solidFill>
+              </a:defRPr>
+            </a:pPr>
+            <a:r>
+              <a:t>Punith C  |  Nov 13, 2025</a:t>
+            </a:r>
+          </a:p>
+        </p:txBody>
+      </p:sp>
+    </p:spTree>
+  </p:cSld>
+  <p:clrMapOvr>
+    <a:masterClrMapping/>
+  </p:clrMapOvr>
+</p:sld>
+</file>
+
+<file path=ppt/slides/slide17.xml><?xml version="1.0" encoding="utf-8"?>
+<p:sld xmlns:a="http://schemas.openxmlformats.org/drawingml/2006/main" xmlns:p="http://schemas.openxmlformats.org/presentationml/2006/main" xmlns:r="http://schemas.openxmlformats.org/officeDocument/2006/relationships">
+  <p:cSld>
+    <p:bg>
+      <p:bgPr>
+        <a:solidFill>
+          <a:srgbClr val="F8FAFC"/>
+        </a:solidFill>
+        <a:effectLst/>
+      </p:bgPr>
+    </p:bg>
+    <p:spTree>
+      <p:nvGrpSpPr>
+        <p:cNvPr id="1" name=""/>
+        <p:cNvGrpSpPr/>
+        <p:nvPr/>
+      </p:nvGrpSpPr>
+      <p:grpSpPr/>
+      <p:sp>
+        <p:nvSpPr>
+          <p:cNvPr id="2" name="Title 1"/>
+          <p:cNvSpPr>
+            <a:spLocks noGrp="1"/>
+          </p:cNvSpPr>
+          <p:nvPr>
+            <p:ph type="title"/>
+          </p:nvPr>
+        </p:nvSpPr>
+        <p:spPr/>
+        <p:txBody>
+          <a:bodyPr/>
+          <a:lstStyle/>
+          <a:p>
+            <a:pPr>
+              <a:defRPr sz="2800" b="1">
+                <a:solidFill>
+                  <a:srgbClr val="0F6CBD"/>
+                </a:solidFill>
+              </a:defRPr>
+            </a:pPr>
+            <a:r>
+              <a:t>Screenshot: App at http://localhost:8090</a:t>
+            </a:r>
+          </a:p>
+        </p:txBody>
+      </p:sp>
+      <p:sp>
+        <p:nvSpPr>
+          <p:cNvPr id="3" name="Rectangle 2"/>
+          <p:cNvSpPr/>
+          <p:nvPr/>
+        </p:nvSpPr>
+        <p:spPr>
+          <a:xfrm>
+            <a:off x="914400" y="1645920"/>
+            <a:ext cx="7315200" cy="3657600"/>
+          </a:xfrm>
+          <a:prstGeom prst="rect">
+            <a:avLst/>
+          </a:prstGeom>
+          <a:solidFill>
+            <a:srgbClr val="E6E6E6"/>
+          </a:solidFill>
+          <a:ln>
+            <a:solidFill>
+              <a:srgbClr val="787878"/>
+            </a:solidFill>
+          </a:ln>
+        </p:spPr>
+        <p:style>
+          <a:lnRef idx="1">
+            <a:schemeClr val="accent1"/>
+          </a:lnRef>
+          <a:fillRef idx="3">
+            <a:schemeClr val="accent1"/>
+          </a:fillRef>
+          <a:effectRef idx="2">
+            <a:schemeClr val="accent1"/>
+          </a:effectRef>
+          <a:fontRef idx="minor">
+            <a:schemeClr val="lt1"/>
+          </a:fontRef>
+        </p:style>
+        <p:txBody>
+          <a:bodyPr rtlCol="0" anchor="ctr"/>
+          <a:lstStyle/>
+          <a:p>
+            <a:pPr algn="ctr"/>
+          </a:p>
+        </p:txBody>
+      </p:sp>
+      <p:sp>
+        <p:nvSpPr>
+          <p:cNvPr id="4" name="TextBox 3"/>
+          <p:cNvSpPr txBox="1"/>
+          <p:nvPr/>
+        </p:nvSpPr>
+        <p:spPr>
+          <a:xfrm>
+            <a:off x="1097280" y="1828800"/>
+            <a:ext cx="6949440" cy="914400"/>
+          </a:xfrm>
+          <a:prstGeom prst="rect">
+            <a:avLst/>
+          </a:prstGeom>
+          <a:noFill/>
+        </p:spPr>
+        <p:txBody>
+          <a:bodyPr wrap="none">
+            <a:spAutoFit/>
+          </a:bodyPr>
+          <a:lstStyle/>
+          <a:p>
+            <a:pPr algn="ctr">
+              <a:defRPr sz="1600"/>
+            </a:pPr>
+            <a:r>
+              <a:t>Place browser screenshot with JS alert here</a:t>
+            </a:r>
+          </a:p>
+        </p:txBody>
+      </p:sp>
+      <p:sp>
+        <p:nvSpPr>
+          <p:cNvPr id="5" name="TextBox 4"/>
+          <p:cNvSpPr txBox="1"/>
+          <p:nvPr/>
+        </p:nvSpPr>
+        <p:spPr>
+          <a:xfrm>
+            <a:off x="457200" y="6217920"/>
+            <a:ext cx="8229600" cy="274320"/>
+          </a:xfrm>
+          <a:prstGeom prst="rect">
+            <a:avLst/>
+          </a:prstGeom>
+          <a:noFill/>
+        </p:spPr>
+        <p:txBody>
+          <a:bodyPr wrap="none">
+            <a:spAutoFit/>
+          </a:bodyPr>
+          <a:lstStyle/>
+          <a:p>
+            <a:pPr algn="r">
+              <a:defRPr sz="1000">
+                <a:solidFill>
+                  <a:srgbClr val="64748B"/>
+                </a:solidFill>
+              </a:defRPr>
+            </a:pPr>
+            <a:r>
+              <a:t>Punith C  |  Nov 13, 2025</a:t>
+            </a:r>
+          </a:p>
+        </p:txBody>
+      </p:sp>
+    </p:spTree>
+  </p:cSld>
+  <p:clrMapOvr>
+    <a:masterClrMapping/>
+  </p:clrMapOvr>
+</p:sld>
+</file>
+
+<file path=ppt/slides/slide18.xml><?xml version="1.0" encoding="utf-8"?>
+<p:sld xmlns:a="http://schemas.openxmlformats.org/drawingml/2006/main" xmlns:p="http://schemas.openxmlformats.org/presentationml/2006/main" xmlns:r="http://schemas.openxmlformats.org/officeDocument/2006/relationships">
+  <p:cSld>
+    <p:bg>
+      <p:bgPr>
+        <a:solidFill>
+          <a:srgbClr val="F8FAFC"/>
+        </a:solidFill>
+        <a:effectLst/>
+      </p:bgPr>
+    </p:bg>
+    <p:spTree>
+      <p:nvGrpSpPr>
+        <p:cNvPr id="1" name=""/>
+        <p:cNvGrpSpPr/>
+        <p:nvPr/>
+      </p:nvGrpSpPr>
+      <p:grpSpPr/>
+      <p:sp>
+        <p:nvSpPr>
+          <p:cNvPr id="2" name="Title 1"/>
+          <p:cNvSpPr>
+            <a:spLocks noGrp="1"/>
+          </p:cNvSpPr>
+          <p:nvPr>
+            <p:ph type="title"/>
+          </p:nvPr>
+        </p:nvSpPr>
+        <p:spPr/>
+        <p:txBody>
+          <a:bodyPr/>
+          <a:lstStyle/>
+          <a:p>
+            <a:pPr>
+              <a:defRPr sz="2800" b="1">
+                <a:solidFill>
+                  <a:srgbClr val="0F6CBD"/>
+                </a:solidFill>
+              </a:defRPr>
+            </a:pPr>
             <a:r>
               <a:t>Thank You</a:t>
             </a:r>
@@ -4318,7 +5106,11 @@
           <a:lstStyle/>
           <a:p>
             <a:pPr>
-              <a:defRPr sz="2000"/>
+              <a:defRPr sz="2000">
+                <a:solidFill>
+                  <a:srgbClr val="1E293B"/>
+                </a:solidFill>
+              </a:defRPr>
             </a:pPr>
             <a:r>
               <a:t>Repo: https://github.com/Punith968/simple-webapp-jenkins-ci-cd</a:t>
@@ -4326,10 +5118,49 @@
           </a:p>
           <a:p>
             <a:pPr>
-              <a:defRPr sz="2000"/>
+              <a:defRPr sz="2000">
+                <a:solidFill>
+                  <a:srgbClr val="1E293B"/>
+                </a:solidFill>
+              </a:defRPr>
             </a:pPr>
             <a:r>
               <a:t>Questions welcome</a:t>
+            </a:r>
+          </a:p>
+        </p:txBody>
+      </p:sp>
+      <p:sp>
+        <p:nvSpPr>
+          <p:cNvPr id="4" name="TextBox 3"/>
+          <p:cNvSpPr txBox="1"/>
+          <p:nvPr/>
+        </p:nvSpPr>
+        <p:spPr>
+          <a:xfrm>
+            <a:off x="457200" y="6217920"/>
+            <a:ext cx="8229600" cy="274320"/>
+          </a:xfrm>
+          <a:prstGeom prst="rect">
+            <a:avLst/>
+          </a:prstGeom>
+          <a:noFill/>
+        </p:spPr>
+        <p:txBody>
+          <a:bodyPr wrap="none">
+            <a:spAutoFit/>
+          </a:bodyPr>
+          <a:lstStyle/>
+          <a:p>
+            <a:pPr algn="r">
+              <a:defRPr sz="1000">
+                <a:solidFill>
+                  <a:srgbClr val="64748B"/>
+                </a:solidFill>
+              </a:defRPr>
+            </a:pPr>
+            <a:r>
+              <a:t>Punith C  |  Nov 13, 2025</a:t>
             </a:r>
           </a:p>
         </p:txBody>
@@ -4345,6 +5176,14 @@
 <file path=ppt/slides/slide2.xml><?xml version="1.0" encoding="utf-8"?>
 <p:sld xmlns:a="http://schemas.openxmlformats.org/drawingml/2006/main" xmlns:p="http://schemas.openxmlformats.org/presentationml/2006/main" xmlns:r="http://schemas.openxmlformats.org/officeDocument/2006/relationships">
   <p:cSld>
+    <p:bg>
+      <p:bgPr>
+        <a:solidFill>
+          <a:srgbClr val="F8FAFC"/>
+        </a:solidFill>
+        <a:effectLst/>
+      </p:bgPr>
+    </p:bg>
     <p:spTree>
       <p:nvGrpSpPr>
         <p:cNvPr id="1" name=""/>
@@ -4367,6 +5206,13 @@
           <a:bodyPr/>
           <a:lstStyle/>
           <a:p>
+            <a:pPr>
+              <a:defRPr sz="2800" b="1">
+                <a:solidFill>
+                  <a:srgbClr val="0F6CBD"/>
+                </a:solidFill>
+              </a:defRPr>
+            </a:pPr>
             <a:r>
               <a:t>Executive Summary</a:t>
             </a:r>
@@ -4389,7 +5235,11 @@
           <a:lstStyle/>
           <a:p>
             <a:pPr>
-              <a:defRPr sz="2000"/>
+              <a:defRPr sz="2000">
+                <a:solidFill>
+                  <a:srgbClr val="1E293B"/>
+                </a:solidFill>
+              </a:defRPr>
             </a:pPr>
             <a:r>
               <a:t>Goal: Automate build → test → deploy for a static site</a:t>
@@ -4397,7 +5247,11 @@
           </a:p>
           <a:p>
             <a:pPr>
-              <a:defRPr sz="2000"/>
+              <a:defRPr sz="2000">
+                <a:solidFill>
+                  <a:srgbClr val="1E293B"/>
+                </a:solidFill>
+              </a:defRPr>
             </a:pPr>
             <a:r>
               <a:t>Pipeline: Checkout, Build, Test, Deploy (4/4 green)</a:t>
@@ -4405,7 +5259,11 @@
           </a:p>
           <a:p>
             <a:pPr>
-              <a:defRPr sz="2000"/>
+              <a:defRPr sz="2000">
+                <a:solidFill>
+                  <a:srgbClr val="1E293B"/>
+                </a:solidFill>
+              </a:defRPr>
             </a:pPr>
             <a:r>
               <a:t>Deployment: Docker (nginx) on port 8090</a:t>
@@ -4413,10 +5271,49 @@
           </a:p>
           <a:p>
             <a:pPr>
-              <a:defRPr sz="2000"/>
+              <a:defRPr sz="2000">
+                <a:solidFill>
+                  <a:srgbClr val="1E293B"/>
+                </a:solidFill>
+              </a:defRPr>
             </a:pPr>
             <a:r>
               <a:t>Result: 100% success; ~15s from commit to running app</a:t>
+            </a:r>
+          </a:p>
+        </p:txBody>
+      </p:sp>
+      <p:sp>
+        <p:nvSpPr>
+          <p:cNvPr id="4" name="TextBox 3"/>
+          <p:cNvSpPr txBox="1"/>
+          <p:nvPr/>
+        </p:nvSpPr>
+        <p:spPr>
+          <a:xfrm>
+            <a:off x="457200" y="6217920"/>
+            <a:ext cx="8229600" cy="274320"/>
+          </a:xfrm>
+          <a:prstGeom prst="rect">
+            <a:avLst/>
+          </a:prstGeom>
+          <a:noFill/>
+        </p:spPr>
+        <p:txBody>
+          <a:bodyPr wrap="none">
+            <a:spAutoFit/>
+          </a:bodyPr>
+          <a:lstStyle/>
+          <a:p>
+            <a:pPr algn="r">
+              <a:defRPr sz="1000">
+                <a:solidFill>
+                  <a:srgbClr val="64748B"/>
+                </a:solidFill>
+              </a:defRPr>
+            </a:pPr>
+            <a:r>
+              <a:t>Punith C  |  Nov 13, 2025</a:t>
             </a:r>
           </a:p>
         </p:txBody>
@@ -4432,6 +5329,14 @@
 <file path=ppt/slides/slide3.xml><?xml version="1.0" encoding="utf-8"?>
 <p:sld xmlns:a="http://schemas.openxmlformats.org/drawingml/2006/main" xmlns:p="http://schemas.openxmlformats.org/presentationml/2006/main" xmlns:r="http://schemas.openxmlformats.org/officeDocument/2006/relationships">
   <p:cSld>
+    <p:bg>
+      <p:bgPr>
+        <a:solidFill>
+          <a:srgbClr val="F8FAFC"/>
+        </a:solidFill>
+        <a:effectLst/>
+      </p:bgPr>
+    </p:bg>
     <p:spTree>
       <p:nvGrpSpPr>
         <p:cNvPr id="1" name=""/>
@@ -4454,6 +5359,13 @@
           <a:bodyPr/>
           <a:lstStyle/>
           <a:p>
+            <a:pPr>
+              <a:defRPr sz="2800" b="1">
+                <a:solidFill>
+                  <a:srgbClr val="0F6CBD"/>
+                </a:solidFill>
+              </a:defRPr>
+            </a:pPr>
             <a:r>
               <a:t>Problem Statement &amp; Objectives</a:t>
             </a:r>
@@ -4476,7 +5388,11 @@
           <a:lstStyle/>
           <a:p>
             <a:pPr>
-              <a:defRPr sz="2000"/>
+              <a:defRPr sz="2000">
+                <a:solidFill>
+                  <a:srgbClr val="1E293B"/>
+                </a:solidFill>
+              </a:defRPr>
             </a:pPr>
             <a:r>
               <a:t>Build a CI/CD pipeline for a static website (HTML/CSS/JS)</a:t>
@@ -4484,7 +5400,11 @@
           </a:p>
           <a:p>
             <a:pPr>
-              <a:defRPr sz="2000"/>
+              <a:defRPr sz="2000">
+                <a:solidFill>
+                  <a:srgbClr val="1E293B"/>
+                </a:solidFill>
+              </a:defRPr>
             </a:pPr>
             <a:r>
               <a:t>Automated validation and reliable deployment</a:t>
@@ -4492,7 +5412,11 @@
           </a:p>
           <a:p>
             <a:pPr>
-              <a:defRPr sz="2000"/>
+              <a:defRPr sz="2000">
+                <a:solidFill>
+                  <a:srgbClr val="1E293B"/>
+                </a:solidFill>
+              </a:defRPr>
             </a:pPr>
             <a:r>
               <a:t>Use Jenkins Declarative Pipeline</a:t>
@@ -4500,10 +5424,49 @@
           </a:p>
           <a:p>
             <a:pPr>
-              <a:defRPr sz="2000"/>
+              <a:defRPr sz="2000">
+                <a:solidFill>
+                  <a:srgbClr val="1E293B"/>
+                </a:solidFill>
+              </a:defRPr>
             </a:pPr>
             <a:r>
               <a:t>Prefer Docker for reproducibility</a:t>
+            </a:r>
+          </a:p>
+        </p:txBody>
+      </p:sp>
+      <p:sp>
+        <p:nvSpPr>
+          <p:cNvPr id="4" name="TextBox 3"/>
+          <p:cNvSpPr txBox="1"/>
+          <p:nvPr/>
+        </p:nvSpPr>
+        <p:spPr>
+          <a:xfrm>
+            <a:off x="457200" y="6217920"/>
+            <a:ext cx="8229600" cy="274320"/>
+          </a:xfrm>
+          <a:prstGeom prst="rect">
+            <a:avLst/>
+          </a:prstGeom>
+          <a:noFill/>
+        </p:spPr>
+        <p:txBody>
+          <a:bodyPr wrap="none">
+            <a:spAutoFit/>
+          </a:bodyPr>
+          <a:lstStyle/>
+          <a:p>
+            <a:pPr algn="r">
+              <a:defRPr sz="1000">
+                <a:solidFill>
+                  <a:srgbClr val="64748B"/>
+                </a:solidFill>
+              </a:defRPr>
+            </a:pPr>
+            <a:r>
+              <a:t>Punith C  |  Nov 13, 2025</a:t>
             </a:r>
           </a:p>
         </p:txBody>
@@ -4519,6 +5482,14 @@
 <file path=ppt/slides/slide4.xml><?xml version="1.0" encoding="utf-8"?>
 <p:sld xmlns:a="http://schemas.openxmlformats.org/drawingml/2006/main" xmlns:p="http://schemas.openxmlformats.org/presentationml/2006/main" xmlns:r="http://schemas.openxmlformats.org/officeDocument/2006/relationships">
   <p:cSld>
+    <p:bg>
+      <p:bgPr>
+        <a:solidFill>
+          <a:srgbClr val="F8FAFC"/>
+        </a:solidFill>
+        <a:effectLst/>
+      </p:bgPr>
+    </p:bg>
     <p:spTree>
       <p:nvGrpSpPr>
         <p:cNvPr id="1" name=""/>
@@ -4541,6 +5512,13 @@
           <a:bodyPr/>
           <a:lstStyle/>
           <a:p>
+            <a:pPr>
+              <a:defRPr sz="2800" b="1">
+                <a:solidFill>
+                  <a:srgbClr val="0F6CBD"/>
+                </a:solidFill>
+              </a:defRPr>
+            </a:pPr>
             <a:r>
               <a:t>Architecture Overview</a:t>
             </a:r>
@@ -4563,7 +5541,11 @@
           <a:lstStyle/>
           <a:p>
             <a:pPr>
-              <a:defRPr sz="2000"/>
+              <a:defRPr sz="2000">
+                <a:solidFill>
+                  <a:srgbClr val="1E293B"/>
+                </a:solidFill>
+              </a:defRPr>
             </a:pPr>
             <a:r>
               <a:t>Flow: Developer (GitHub) → Jenkins → Docker Image → Nginx Container → Browser</a:t>
@@ -4571,7 +5553,11 @@
           </a:p>
           <a:p>
             <a:pPr>
-              <a:defRPr sz="2000"/>
+              <a:defRPr sz="2000">
+                <a:solidFill>
+                  <a:srgbClr val="1E293B"/>
+                </a:solidFill>
+              </a:defRPr>
             </a:pPr>
             <a:r>
               <a:t>Environment: Windows host + WSL2 Ubuntu agent</a:t>
@@ -4579,10 +5565,49 @@
           </a:p>
           <a:p>
             <a:pPr>
-              <a:defRPr sz="2000"/>
+              <a:defRPr sz="2000">
+                <a:solidFill>
+                  <a:srgbClr val="1E293B"/>
+                </a:solidFill>
+              </a:defRPr>
             </a:pPr>
             <a:r>
               <a:t>Base image: nginx:alpine</a:t>
+            </a:r>
+          </a:p>
+        </p:txBody>
+      </p:sp>
+      <p:sp>
+        <p:nvSpPr>
+          <p:cNvPr id="4" name="TextBox 3"/>
+          <p:cNvSpPr txBox="1"/>
+          <p:nvPr/>
+        </p:nvSpPr>
+        <p:spPr>
+          <a:xfrm>
+            <a:off x="457200" y="6217920"/>
+            <a:ext cx="8229600" cy="274320"/>
+          </a:xfrm>
+          <a:prstGeom prst="rect">
+            <a:avLst/>
+          </a:prstGeom>
+          <a:noFill/>
+        </p:spPr>
+        <p:txBody>
+          <a:bodyPr wrap="none">
+            <a:spAutoFit/>
+          </a:bodyPr>
+          <a:lstStyle/>
+          <a:p>
+            <a:pPr algn="r">
+              <a:defRPr sz="1000">
+                <a:solidFill>
+                  <a:srgbClr val="64748B"/>
+                </a:solidFill>
+              </a:defRPr>
+            </a:pPr>
+            <a:r>
+              <a:t>Punith C  |  Nov 13, 2025</a:t>
             </a:r>
           </a:p>
         </p:txBody>
@@ -4598,6 +5623,14 @@
 <file path=ppt/slides/slide5.xml><?xml version="1.0" encoding="utf-8"?>
 <p:sld xmlns:a="http://schemas.openxmlformats.org/drawingml/2006/main" xmlns:p="http://schemas.openxmlformats.org/presentationml/2006/main" xmlns:r="http://schemas.openxmlformats.org/officeDocument/2006/relationships">
   <p:cSld>
+    <p:bg>
+      <p:bgPr>
+        <a:solidFill>
+          <a:srgbClr val="F8FAFC"/>
+        </a:solidFill>
+        <a:effectLst/>
+      </p:bgPr>
+    </p:bg>
     <p:spTree>
       <p:nvGrpSpPr>
         <p:cNvPr id="1" name=""/>
@@ -4620,6 +5653,13 @@
           <a:bodyPr/>
           <a:lstStyle/>
           <a:p>
+            <a:pPr>
+              <a:defRPr sz="2800" b="1">
+                <a:solidFill>
+                  <a:srgbClr val="0F6CBD"/>
+                </a:solidFill>
+              </a:defRPr>
+            </a:pPr>
             <a:r>
               <a:t>Technologies Used</a:t>
             </a:r>
@@ -4642,7 +5682,11 @@
           <a:lstStyle/>
           <a:p>
             <a:pPr>
-              <a:defRPr sz="2000"/>
+              <a:defRPr sz="2000">
+                <a:solidFill>
+                  <a:srgbClr val="1E293B"/>
+                </a:solidFill>
+              </a:defRPr>
             </a:pPr>
             <a:r>
               <a:t>HTML5, CSS3, JavaScript</a:t>
@@ -4650,7 +5694,11 @@
           </a:p>
           <a:p>
             <a:pPr>
-              <a:defRPr sz="2000"/>
+              <a:defRPr sz="2000">
+                <a:solidFill>
+                  <a:srgbClr val="1E293B"/>
+                </a:solidFill>
+              </a:defRPr>
             </a:pPr>
             <a:r>
               <a:t>Nginx (nginx:alpine)</a:t>
@@ -4658,7 +5706,11 @@
           </a:p>
           <a:p>
             <a:pPr>
-              <a:defRPr sz="2000"/>
+              <a:defRPr sz="2000">
+                <a:solidFill>
+                  <a:srgbClr val="1E293B"/>
+                </a:solidFill>
+              </a:defRPr>
             </a:pPr>
             <a:r>
               <a:t>Docker</a:t>
@@ -4666,7 +5718,11 @@
           </a:p>
           <a:p>
             <a:pPr>
-              <a:defRPr sz="2000"/>
+              <a:defRPr sz="2000">
+                <a:solidFill>
+                  <a:srgbClr val="1E293B"/>
+                </a:solidFill>
+              </a:defRPr>
             </a:pPr>
             <a:r>
               <a:t>Jenkins (Declarative)</a:t>
@@ -4674,10 +5730,49 @@
           </a:p>
           <a:p>
             <a:pPr>
-              <a:defRPr sz="2000"/>
+              <a:defRPr sz="2000">
+                <a:solidFill>
+                  <a:srgbClr val="1E293B"/>
+                </a:solidFill>
+              </a:defRPr>
             </a:pPr>
             <a:r>
               <a:t>Git/GitHub</a:t>
+            </a:r>
+          </a:p>
+        </p:txBody>
+      </p:sp>
+      <p:sp>
+        <p:nvSpPr>
+          <p:cNvPr id="4" name="TextBox 3"/>
+          <p:cNvSpPr txBox="1"/>
+          <p:nvPr/>
+        </p:nvSpPr>
+        <p:spPr>
+          <a:xfrm>
+            <a:off x="457200" y="6217920"/>
+            <a:ext cx="8229600" cy="274320"/>
+          </a:xfrm>
+          <a:prstGeom prst="rect">
+            <a:avLst/>
+          </a:prstGeom>
+          <a:noFill/>
+        </p:spPr>
+        <p:txBody>
+          <a:bodyPr wrap="none">
+            <a:spAutoFit/>
+          </a:bodyPr>
+          <a:lstStyle/>
+          <a:p>
+            <a:pPr algn="r">
+              <a:defRPr sz="1000">
+                <a:solidFill>
+                  <a:srgbClr val="64748B"/>
+                </a:solidFill>
+              </a:defRPr>
+            </a:pPr>
+            <a:r>
+              <a:t>Punith C  |  Nov 13, 2025</a:t>
             </a:r>
           </a:p>
         </p:txBody>
@@ -4693,6 +5788,14 @@
 <file path=ppt/slides/slide6.xml><?xml version="1.0" encoding="utf-8"?>
 <p:sld xmlns:a="http://schemas.openxmlformats.org/drawingml/2006/main" xmlns:p="http://schemas.openxmlformats.org/presentationml/2006/main" xmlns:r="http://schemas.openxmlformats.org/officeDocument/2006/relationships">
   <p:cSld>
+    <p:bg>
+      <p:bgPr>
+        <a:solidFill>
+          <a:srgbClr val="F8FAFC"/>
+        </a:solidFill>
+        <a:effectLst/>
+      </p:bgPr>
+    </p:bg>
     <p:spTree>
       <p:nvGrpSpPr>
         <p:cNvPr id="1" name=""/>
@@ -4715,6 +5818,13 @@
           <a:bodyPr/>
           <a:lstStyle/>
           <a:p>
+            <a:pPr>
+              <a:defRPr sz="2800" b="1">
+                <a:solidFill>
+                  <a:srgbClr val="0F6CBD"/>
+                </a:solidFill>
+              </a:defRPr>
+            </a:pPr>
             <a:r>
               <a:t>Tools &amp; Environment</a:t>
             </a:r>
@@ -4737,7 +5847,11 @@
           <a:lstStyle/>
           <a:p>
             <a:pPr>
-              <a:defRPr sz="2000"/>
+              <a:defRPr sz="2000">
+                <a:solidFill>
+                  <a:srgbClr val="1E293B"/>
+                </a:solidFill>
+              </a:defRPr>
             </a:pPr>
             <a:r>
               <a:t>Jenkins 2.528.2, Docker 28.2.2, Git 2.43.0</a:t>
@@ -4745,7 +5859,11 @@
           </a:p>
           <a:p>
             <a:pPr>
-              <a:defRPr sz="2000"/>
+              <a:defRPr sz="2000">
+                <a:solidFill>
+                  <a:srgbClr val="1E293B"/>
+                </a:solidFill>
+              </a:defRPr>
             </a:pPr>
             <a:r>
               <a:t>Windows + WSL2 (Ubuntu 24.04)</a:t>
@@ -4753,7 +5871,11 @@
           </a:p>
           <a:p>
             <a:pPr>
-              <a:defRPr sz="2000"/>
+              <a:defRPr sz="2000">
+                <a:solidFill>
+                  <a:srgbClr val="1E293B"/>
+                </a:solidFill>
+              </a:defRPr>
             </a:pPr>
             <a:r>
               <a:t>VS Code; PowerShell + bash</a:t>
@@ -4761,10 +5883,49 @@
           </a:p>
           <a:p>
             <a:pPr>
-              <a:defRPr sz="2000"/>
+              <a:defRPr sz="2000">
+                <a:solidFill>
+                  <a:srgbClr val="1E293B"/>
+                </a:solidFill>
+              </a:defRPr>
             </a:pPr>
             <a:r>
               <a:t>Optional: docker-compose</a:t>
+            </a:r>
+          </a:p>
+        </p:txBody>
+      </p:sp>
+      <p:sp>
+        <p:nvSpPr>
+          <p:cNvPr id="4" name="TextBox 3"/>
+          <p:cNvSpPr txBox="1"/>
+          <p:nvPr/>
+        </p:nvSpPr>
+        <p:spPr>
+          <a:xfrm>
+            <a:off x="457200" y="6217920"/>
+            <a:ext cx="8229600" cy="274320"/>
+          </a:xfrm>
+          <a:prstGeom prst="rect">
+            <a:avLst/>
+          </a:prstGeom>
+          <a:noFill/>
+        </p:spPr>
+        <p:txBody>
+          <a:bodyPr wrap="none">
+            <a:spAutoFit/>
+          </a:bodyPr>
+          <a:lstStyle/>
+          <a:p>
+            <a:pPr algn="r">
+              <a:defRPr sz="1000">
+                <a:solidFill>
+                  <a:srgbClr val="64748B"/>
+                </a:solidFill>
+              </a:defRPr>
+            </a:pPr>
+            <a:r>
+              <a:t>Punith C  |  Nov 13, 2025</a:t>
             </a:r>
           </a:p>
         </p:txBody>
@@ -4780,6 +5941,14 @@
 <file path=ppt/slides/slide7.xml><?xml version="1.0" encoding="utf-8"?>
 <p:sld xmlns:a="http://schemas.openxmlformats.org/drawingml/2006/main" xmlns:p="http://schemas.openxmlformats.org/presentationml/2006/main" xmlns:r="http://schemas.openxmlformats.org/officeDocument/2006/relationships">
   <p:cSld>
+    <p:bg>
+      <p:bgPr>
+        <a:solidFill>
+          <a:srgbClr val="F8FAFC"/>
+        </a:solidFill>
+        <a:effectLst/>
+      </p:bgPr>
+    </p:bg>
     <p:spTree>
       <p:nvGrpSpPr>
         <p:cNvPr id="1" name=""/>
@@ -4802,6 +5971,13 @@
           <a:bodyPr/>
           <a:lstStyle/>
           <a:p>
+            <a:pPr>
+              <a:defRPr sz="2800" b="1">
+                <a:solidFill>
+                  <a:srgbClr val="0F6CBD"/>
+                </a:solidFill>
+              </a:defRPr>
+            </a:pPr>
             <a:r>
               <a:t>Repository &amp; Files</a:t>
             </a:r>
@@ -4824,7 +6000,11 @@
           <a:lstStyle/>
           <a:p>
             <a:pPr>
-              <a:defRPr sz="2000"/>
+              <a:defRPr sz="2000">
+                <a:solidFill>
+                  <a:srgbClr val="1E293B"/>
+                </a:solidFill>
+              </a:defRPr>
             </a:pPr>
             <a:r>
               <a:t>App: index.html, styles.css, script.js</a:t>
@@ -4832,7 +6012,11 @@
           </a:p>
           <a:p>
             <a:pPr>
-              <a:defRPr sz="2000"/>
+              <a:defRPr sz="2000">
+                <a:solidFill>
+                  <a:srgbClr val="1E293B"/>
+                </a:solidFill>
+              </a:defRPr>
             </a:pPr>
             <a:r>
               <a:t>Pipeline: Jenkinsfile (Declarative)</a:t>
@@ -4840,7 +6024,11 @@
           </a:p>
           <a:p>
             <a:pPr>
-              <a:defRPr sz="2000"/>
+              <a:defRPr sz="2000">
+                <a:solidFill>
+                  <a:srgbClr val="1E293B"/>
+                </a:solidFill>
+              </a:defRPr>
             </a:pPr>
             <a:r>
               <a:t>Container: Dockerfile, docker-compose.yml</a:t>
@@ -4848,7 +6036,11 @@
           </a:p>
           <a:p>
             <a:pPr>
-              <a:defRPr sz="2000"/>
+              <a:defRPr sz="2000">
+                <a:solidFill>
+                  <a:srgbClr val="1E293B"/>
+                </a:solidFill>
+              </a:defRPr>
             </a:pPr>
             <a:r>
               <a:t>Scripts: validate.sh, deploy.sh (alt method)</a:t>
@@ -4856,10 +6048,49 @@
           </a:p>
           <a:p>
             <a:pPr>
-              <a:defRPr sz="2000"/>
+              <a:defRPr sz="2000">
+                <a:solidFill>
+                  <a:srgbClr val="1E293B"/>
+                </a:solidFill>
+              </a:defRPr>
             </a:pPr>
             <a:r>
               <a:t>Docs: README, CASE-STUDY-SUMMARY, DEPLOYMENT-GUIDE</a:t>
+            </a:r>
+          </a:p>
+        </p:txBody>
+      </p:sp>
+      <p:sp>
+        <p:nvSpPr>
+          <p:cNvPr id="4" name="TextBox 3"/>
+          <p:cNvSpPr txBox="1"/>
+          <p:nvPr/>
+        </p:nvSpPr>
+        <p:spPr>
+          <a:xfrm>
+            <a:off x="457200" y="6217920"/>
+            <a:ext cx="8229600" cy="274320"/>
+          </a:xfrm>
+          <a:prstGeom prst="rect">
+            <a:avLst/>
+          </a:prstGeom>
+          <a:noFill/>
+        </p:spPr>
+        <p:txBody>
+          <a:bodyPr wrap="none">
+            <a:spAutoFit/>
+          </a:bodyPr>
+          <a:lstStyle/>
+          <a:p>
+            <a:pPr algn="r">
+              <a:defRPr sz="1000">
+                <a:solidFill>
+                  <a:srgbClr val="64748B"/>
+                </a:solidFill>
+              </a:defRPr>
+            </a:pPr>
+            <a:r>
+              <a:t>Punith C  |  Nov 13, 2025</a:t>
             </a:r>
           </a:p>
         </p:txBody>
@@ -4875,6 +6106,14 @@
 <file path=ppt/slides/slide8.xml><?xml version="1.0" encoding="utf-8"?>
 <p:sld xmlns:a="http://schemas.openxmlformats.org/drawingml/2006/main" xmlns:p="http://schemas.openxmlformats.org/presentationml/2006/main" xmlns:r="http://schemas.openxmlformats.org/officeDocument/2006/relationships">
   <p:cSld>
+    <p:bg>
+      <p:bgPr>
+        <a:solidFill>
+          <a:srgbClr val="F8FAFC"/>
+        </a:solidFill>
+        <a:effectLst/>
+      </p:bgPr>
+    </p:bg>
     <p:spTree>
       <p:nvGrpSpPr>
         <p:cNvPr id="1" name=""/>
@@ -4897,6 +6136,13 @@
           <a:bodyPr/>
           <a:lstStyle/>
           <a:p>
+            <a:pPr>
+              <a:defRPr sz="2800" b="1">
+                <a:solidFill>
+                  <a:srgbClr val="0F6CBD"/>
+                </a:solidFill>
+              </a:defRPr>
+            </a:pPr>
             <a:r>
               <a:t>Pipeline Design (Stages)</a:t>
             </a:r>
@@ -4919,7 +6165,11 @@
           <a:lstStyle/>
           <a:p>
             <a:pPr>
-              <a:defRPr sz="2000"/>
+              <a:defRPr sz="2000">
+                <a:solidFill>
+                  <a:srgbClr val="1E293B"/>
+                </a:solidFill>
+              </a:defRPr>
             </a:pPr>
             <a:r>
               <a:t>Checkout → Build (validate.sh) → Test (validate.sh) → Deploy (docker build/run)</a:t>
@@ -4927,7 +6177,11 @@
           </a:p>
           <a:p>
             <a:pPr>
-              <a:defRPr sz="2000"/>
+              <a:defRPr sz="2000">
+                <a:solidFill>
+                  <a:srgbClr val="1E293B"/>
+                </a:solidFill>
+              </a:defRPr>
             </a:pPr>
             <a:r>
               <a:t>Env: DEPLOY_METHOD=docker, CONTAINER_NAME=simple-webapp-demo, WEBAPP_PORT=8090</a:t>
@@ -4935,10 +6189,49 @@
           </a:p>
           <a:p>
             <a:pPr>
-              <a:defRPr sz="2000"/>
+              <a:defRPr sz="2000">
+                <a:solidFill>
+                  <a:srgbClr val="1E293B"/>
+                </a:solidFill>
+              </a:defRPr>
             </a:pPr>
             <a:r>
               <a:t>dir() wrappers handle nested repo path</a:t>
+            </a:r>
+          </a:p>
+        </p:txBody>
+      </p:sp>
+      <p:sp>
+        <p:nvSpPr>
+          <p:cNvPr id="4" name="TextBox 3"/>
+          <p:cNvSpPr txBox="1"/>
+          <p:nvPr/>
+        </p:nvSpPr>
+        <p:spPr>
+          <a:xfrm>
+            <a:off x="457200" y="6217920"/>
+            <a:ext cx="8229600" cy="274320"/>
+          </a:xfrm>
+          <a:prstGeom prst="rect">
+            <a:avLst/>
+          </a:prstGeom>
+          <a:noFill/>
+        </p:spPr>
+        <p:txBody>
+          <a:bodyPr wrap="none">
+            <a:spAutoFit/>
+          </a:bodyPr>
+          <a:lstStyle/>
+          <a:p>
+            <a:pPr algn="r">
+              <a:defRPr sz="1000">
+                <a:solidFill>
+                  <a:srgbClr val="64748B"/>
+                </a:solidFill>
+              </a:defRPr>
+            </a:pPr>
+            <a:r>
+              <a:t>Punith C  |  Nov 13, 2025</a:t>
             </a:r>
           </a:p>
         </p:txBody>
@@ -4954,6 +6247,14 @@
 <file path=ppt/slides/slide9.xml><?xml version="1.0" encoding="utf-8"?>
 <p:sld xmlns:a="http://schemas.openxmlformats.org/drawingml/2006/main" xmlns:p="http://schemas.openxmlformats.org/presentationml/2006/main" xmlns:r="http://schemas.openxmlformats.org/officeDocument/2006/relationships">
   <p:cSld>
+    <p:bg>
+      <p:bgPr>
+        <a:solidFill>
+          <a:srgbClr val="F8FAFC"/>
+        </a:solidFill>
+        <a:effectLst/>
+      </p:bgPr>
+    </p:bg>
     <p:spTree>
       <p:nvGrpSpPr>
         <p:cNvPr id="1" name=""/>
@@ -4976,6 +6277,13 @@
           <a:bodyPr/>
           <a:lstStyle/>
           <a:p>
+            <a:pPr>
+              <a:defRPr sz="2800" b="1">
+                <a:solidFill>
+                  <a:srgbClr val="0F6CBD"/>
+                </a:solidFill>
+              </a:defRPr>
+            </a:pPr>
             <a:r>
               <a:t>Implementation Steps</a:t>
             </a:r>
@@ -4998,7 +6306,11 @@
           <a:lstStyle/>
           <a:p>
             <a:pPr>
-              <a:defRPr sz="2000"/>
+              <a:defRPr sz="2000">
+                <a:solidFill>
+                  <a:srgbClr val="1E293B"/>
+                </a:solidFill>
+              </a:defRPr>
             </a:pPr>
             <a:r>
               <a:t>Setup repo, scripts; push to GitHub</a:t>
@@ -5006,7 +6318,11 @@
           </a:p>
           <a:p>
             <a:pPr>
-              <a:defRPr sz="2000"/>
+              <a:defRPr sz="2000">
+                <a:solidFill>
+                  <a:srgbClr val="1E293B"/>
+                </a:solidFill>
+              </a:defRPr>
             </a:pPr>
             <a:r>
               <a:t>Configure Jenkins (Pipeline from SCM; correct script path)</a:t>
@@ -5014,7 +6330,11 @@
           </a:p>
           <a:p>
             <a:pPr>
-              <a:defRPr sz="2000"/>
+              <a:defRPr sz="2000">
+                <a:solidFill>
+                  <a:srgbClr val="1E293B"/>
+                </a:solidFill>
+              </a:defRPr>
             </a:pPr>
             <a:r>
               <a:t>chmod +x scripts; ensure Docker access for Jenkins</a:t>
@@ -5022,10 +6342,49 @@
           </a:p>
           <a:p>
             <a:pPr>
-              <a:defRPr sz="2000"/>
+              <a:defRPr sz="2000">
+                <a:solidFill>
+                  <a:srgbClr val="1E293B"/>
+                </a:solidFill>
+              </a:defRPr>
             </a:pPr>
             <a:r>
               <a:t>Pre-pull nginx:alpine to avoid timeouts</a:t>
+            </a:r>
+          </a:p>
+        </p:txBody>
+      </p:sp>
+      <p:sp>
+        <p:nvSpPr>
+          <p:cNvPr id="4" name="TextBox 3"/>
+          <p:cNvSpPr txBox="1"/>
+          <p:nvPr/>
+        </p:nvSpPr>
+        <p:spPr>
+          <a:xfrm>
+            <a:off x="457200" y="6217920"/>
+            <a:ext cx="8229600" cy="274320"/>
+          </a:xfrm>
+          <a:prstGeom prst="rect">
+            <a:avLst/>
+          </a:prstGeom>
+          <a:noFill/>
+        </p:spPr>
+        <p:txBody>
+          <a:bodyPr wrap="none">
+            <a:spAutoFit/>
+          </a:bodyPr>
+          <a:lstStyle/>
+          <a:p>
+            <a:pPr algn="r">
+              <a:defRPr sz="1000">
+                <a:solidFill>
+                  <a:srgbClr val="64748B"/>
+                </a:solidFill>
+              </a:defRPr>
+            </a:pPr>
+            <a:r>
+              <a:t>Punith C  |  Nov 13, 2025</a:t>
             </a:r>
           </a:p>
         </p:txBody>

</xml_diff>

<commit_message>
Add short deck, placeholder screenshots, theme improvements, and PDF exports
</commit_message>
<xml_diff>
--- a/simple-webapp-jenkins-ci-cd/project_presentation.pptx
+++ b/simple-webapp-jenkins-ci-cd/project_presentation.pptx
@@ -3731,7 +3731,50 @@
       </p:sp>
       <p:sp>
         <p:nvSpPr>
-          <p:cNvPr id="4" name="TextBox 3"/>
+          <p:cNvPr id="4" name="Rectangle 3"/>
+          <p:cNvSpPr/>
+          <p:nvPr/>
+        </p:nvSpPr>
+        <p:spPr>
+          <a:xfrm>
+            <a:off x="0" y="0"/>
+            <a:ext cx="9144000" cy="228600"/>
+          </a:xfrm>
+          <a:prstGeom prst="rect">
+            <a:avLst/>
+          </a:prstGeom>
+          <a:solidFill>
+            <a:srgbClr val="0F6CBD"/>
+          </a:solidFill>
+          <a:ln>
+            <a:noFill/>
+          </a:ln>
+        </p:spPr>
+        <p:style>
+          <a:lnRef idx="1">
+            <a:schemeClr val="accent1"/>
+          </a:lnRef>
+          <a:fillRef idx="3">
+            <a:schemeClr val="accent1"/>
+          </a:fillRef>
+          <a:effectRef idx="2">
+            <a:schemeClr val="accent1"/>
+          </a:effectRef>
+          <a:fontRef idx="minor">
+            <a:schemeClr val="lt1"/>
+          </a:fontRef>
+        </p:style>
+        <p:txBody>
+          <a:bodyPr rtlCol="0" anchor="ctr"/>
+          <a:lstStyle/>
+          <a:p>
+            <a:pPr algn="ctr"/>
+          </a:p>
+        </p:txBody>
+      </p:sp>
+      <p:sp>
+        <p:nvSpPr>
+          <p:cNvPr id="5" name="TextBox 4"/>
           <p:cNvSpPr txBox="1"/>
           <p:nvPr/>
         </p:nvSpPr>
@@ -3884,7 +3927,50 @@
       </p:sp>
       <p:sp>
         <p:nvSpPr>
-          <p:cNvPr id="4" name="TextBox 3"/>
+          <p:cNvPr id="4" name="Rectangle 3"/>
+          <p:cNvSpPr/>
+          <p:nvPr/>
+        </p:nvSpPr>
+        <p:spPr>
+          <a:xfrm>
+            <a:off x="0" y="0"/>
+            <a:ext cx="9144000" cy="228600"/>
+          </a:xfrm>
+          <a:prstGeom prst="rect">
+            <a:avLst/>
+          </a:prstGeom>
+          <a:solidFill>
+            <a:srgbClr val="0F6CBD"/>
+          </a:solidFill>
+          <a:ln>
+            <a:noFill/>
+          </a:ln>
+        </p:spPr>
+        <p:style>
+          <a:lnRef idx="1">
+            <a:schemeClr val="accent1"/>
+          </a:lnRef>
+          <a:fillRef idx="3">
+            <a:schemeClr val="accent1"/>
+          </a:fillRef>
+          <a:effectRef idx="2">
+            <a:schemeClr val="accent1"/>
+          </a:effectRef>
+          <a:fontRef idx="minor">
+            <a:schemeClr val="lt1"/>
+          </a:fontRef>
+        </p:style>
+        <p:txBody>
+          <a:bodyPr rtlCol="0" anchor="ctr"/>
+          <a:lstStyle/>
+          <a:p>
+            <a:pPr algn="ctr"/>
+          </a:p>
+        </p:txBody>
+      </p:sp>
+      <p:sp>
+        <p:nvSpPr>
+          <p:cNvPr id="5" name="TextBox 4"/>
           <p:cNvSpPr txBox="1"/>
           <p:nvPr/>
         </p:nvSpPr>
@@ -4037,7 +4123,50 @@
       </p:sp>
       <p:sp>
         <p:nvSpPr>
-          <p:cNvPr id="4" name="TextBox 3"/>
+          <p:cNvPr id="4" name="Rectangle 3"/>
+          <p:cNvSpPr/>
+          <p:nvPr/>
+        </p:nvSpPr>
+        <p:spPr>
+          <a:xfrm>
+            <a:off x="0" y="0"/>
+            <a:ext cx="9144000" cy="228600"/>
+          </a:xfrm>
+          <a:prstGeom prst="rect">
+            <a:avLst/>
+          </a:prstGeom>
+          <a:solidFill>
+            <a:srgbClr val="0F6CBD"/>
+          </a:solidFill>
+          <a:ln>
+            <a:noFill/>
+          </a:ln>
+        </p:spPr>
+        <p:style>
+          <a:lnRef idx="1">
+            <a:schemeClr val="accent1"/>
+          </a:lnRef>
+          <a:fillRef idx="3">
+            <a:schemeClr val="accent1"/>
+          </a:fillRef>
+          <a:effectRef idx="2">
+            <a:schemeClr val="accent1"/>
+          </a:effectRef>
+          <a:fontRef idx="minor">
+            <a:schemeClr val="lt1"/>
+          </a:fontRef>
+        </p:style>
+        <p:txBody>
+          <a:bodyPr rtlCol="0" anchor="ctr"/>
+          <a:lstStyle/>
+          <a:p>
+            <a:pPr algn="ctr"/>
+          </a:p>
+        </p:txBody>
+      </p:sp>
+      <p:sp>
+        <p:nvSpPr>
+          <p:cNvPr id="5" name="TextBox 4"/>
           <p:cNvSpPr txBox="1"/>
           <p:nvPr/>
         </p:nvSpPr>
@@ -4202,7 +4331,50 @@
       </p:sp>
       <p:sp>
         <p:nvSpPr>
-          <p:cNvPr id="4" name="TextBox 3"/>
+          <p:cNvPr id="4" name="Rectangle 3"/>
+          <p:cNvSpPr/>
+          <p:nvPr/>
+        </p:nvSpPr>
+        <p:spPr>
+          <a:xfrm>
+            <a:off x="0" y="0"/>
+            <a:ext cx="9144000" cy="228600"/>
+          </a:xfrm>
+          <a:prstGeom prst="rect">
+            <a:avLst/>
+          </a:prstGeom>
+          <a:solidFill>
+            <a:srgbClr val="0F6CBD"/>
+          </a:solidFill>
+          <a:ln>
+            <a:noFill/>
+          </a:ln>
+        </p:spPr>
+        <p:style>
+          <a:lnRef idx="1">
+            <a:schemeClr val="accent1"/>
+          </a:lnRef>
+          <a:fillRef idx="3">
+            <a:schemeClr val="accent1"/>
+          </a:fillRef>
+          <a:effectRef idx="2">
+            <a:schemeClr val="accent1"/>
+          </a:effectRef>
+          <a:fontRef idx="minor">
+            <a:schemeClr val="lt1"/>
+          </a:fontRef>
+        </p:style>
+        <p:txBody>
+          <a:bodyPr rtlCol="0" anchor="ctr"/>
+          <a:lstStyle/>
+          <a:p>
+            <a:pPr algn="ctr"/>
+          </a:p>
+        </p:txBody>
+      </p:sp>
+      <p:sp>
+        <p:nvSpPr>
+          <p:cNvPr id="5" name="TextBox 4"/>
           <p:cNvSpPr txBox="1"/>
           <p:nvPr/>
         </p:nvSpPr>
@@ -4355,7 +4527,50 @@
       </p:sp>
       <p:sp>
         <p:nvSpPr>
-          <p:cNvPr id="4" name="TextBox 3"/>
+          <p:cNvPr id="4" name="Rectangle 3"/>
+          <p:cNvSpPr/>
+          <p:nvPr/>
+        </p:nvSpPr>
+        <p:spPr>
+          <a:xfrm>
+            <a:off x="0" y="0"/>
+            <a:ext cx="9144000" cy="228600"/>
+          </a:xfrm>
+          <a:prstGeom prst="rect">
+            <a:avLst/>
+          </a:prstGeom>
+          <a:solidFill>
+            <a:srgbClr val="0F6CBD"/>
+          </a:solidFill>
+          <a:ln>
+            <a:noFill/>
+          </a:ln>
+        </p:spPr>
+        <p:style>
+          <a:lnRef idx="1">
+            <a:schemeClr val="accent1"/>
+          </a:lnRef>
+          <a:fillRef idx="3">
+            <a:schemeClr val="accent1"/>
+          </a:fillRef>
+          <a:effectRef idx="2">
+            <a:schemeClr val="accent1"/>
+          </a:effectRef>
+          <a:fontRef idx="minor">
+            <a:schemeClr val="lt1"/>
+          </a:fontRef>
+        </p:style>
+        <p:txBody>
+          <a:bodyPr rtlCol="0" anchor="ctr"/>
+          <a:lstStyle/>
+          <a:p>
+            <a:pPr algn="ctr"/>
+          </a:p>
+        </p:txBody>
+      </p:sp>
+      <p:sp>
+        <p:nvSpPr>
+          <p:cNvPr id="5" name="TextBox 4"/>
           <p:cNvSpPr txBox="1"/>
           <p:nvPr/>
         </p:nvSpPr>
@@ -4508,7 +4723,50 @@
       </p:sp>
       <p:sp>
         <p:nvSpPr>
-          <p:cNvPr id="4" name="TextBox 3"/>
+          <p:cNvPr id="4" name="Rectangle 3"/>
+          <p:cNvSpPr/>
+          <p:nvPr/>
+        </p:nvSpPr>
+        <p:spPr>
+          <a:xfrm>
+            <a:off x="0" y="0"/>
+            <a:ext cx="9144000" cy="228600"/>
+          </a:xfrm>
+          <a:prstGeom prst="rect">
+            <a:avLst/>
+          </a:prstGeom>
+          <a:solidFill>
+            <a:srgbClr val="0F6CBD"/>
+          </a:solidFill>
+          <a:ln>
+            <a:noFill/>
+          </a:ln>
+        </p:spPr>
+        <p:style>
+          <a:lnRef idx="1">
+            <a:schemeClr val="accent1"/>
+          </a:lnRef>
+          <a:fillRef idx="3">
+            <a:schemeClr val="accent1"/>
+          </a:fillRef>
+          <a:effectRef idx="2">
+            <a:schemeClr val="accent1"/>
+          </a:effectRef>
+          <a:fontRef idx="minor">
+            <a:schemeClr val="lt1"/>
+          </a:fontRef>
+        </p:style>
+        <p:txBody>
+          <a:bodyPr rtlCol="0" anchor="ctr"/>
+          <a:lstStyle/>
+          <a:p>
+            <a:pPr algn="ctr"/>
+          </a:p>
+        </p:txBody>
+      </p:sp>
+      <p:sp>
+        <p:nvSpPr>
+          <p:cNvPr id="5" name="TextBox 4"/>
           <p:cNvSpPr txBox="1"/>
           <p:nvPr/>
         </p:nvSpPr>
@@ -4603,19 +4861,17 @@
         </p:nvSpPr>
         <p:spPr>
           <a:xfrm>
-            <a:off x="914400" y="1645920"/>
-            <a:ext cx="7315200" cy="3657600"/>
+            <a:off x="0" y="0"/>
+            <a:ext cx="9144000" cy="228600"/>
           </a:xfrm>
           <a:prstGeom prst="rect">
             <a:avLst/>
           </a:prstGeom>
           <a:solidFill>
-            <a:srgbClr val="E6E6E6"/>
+            <a:srgbClr val="0F6CBD"/>
           </a:solidFill>
           <a:ln>
-            <a:solidFill>
-              <a:srgbClr val="787878"/>
-            </a:solidFill>
+            <a:noFill/>
           </a:ln>
         </p:spPr>
         <p:style>
@@ -4640,37 +4896,30 @@
           </a:p>
         </p:txBody>
       </p:sp>
-      <p:sp>
-        <p:nvSpPr>
-          <p:cNvPr id="4" name="TextBox 3"/>
-          <p:cNvSpPr txBox="1"/>
+      <p:pic>
+        <p:nvPicPr>
+          <p:cNvPr id="4" name="Picture 3" descr="jenkins_build.png"/>
+          <p:cNvPicPr>
+            <a:picLocks noChangeAspect="1"/>
+          </p:cNvPicPr>
           <p:nvPr/>
-        </p:nvSpPr>
+        </p:nvPicPr>
+        <p:blipFill>
+          <a:blip r:embed="rId2"/>
+          <a:stretch>
+            <a:fillRect/>
+          </a:stretch>
+        </p:blipFill>
         <p:spPr>
           <a:xfrm>
-            <a:off x="1097280" y="1828800"/>
-            <a:ext cx="6949440" cy="914400"/>
+            <a:off x="914400" y="1371600"/>
+            <a:ext cx="7315200" cy="4114800"/>
           </a:xfrm>
           <a:prstGeom prst="rect">
             <a:avLst/>
           </a:prstGeom>
-          <a:noFill/>
         </p:spPr>
-        <p:txBody>
-          <a:bodyPr wrap="none">
-            <a:spAutoFit/>
-          </a:bodyPr>
-          <a:lstStyle/>
-          <a:p>
-            <a:pPr algn="ctr">
-              <a:defRPr sz="1600"/>
-            </a:pPr>
-            <a:r>
-              <a:t>Place Jenkins build screenshot here (4/4 green stages)</a:t>
-            </a:r>
-          </a:p>
-        </p:txBody>
-      </p:sp>
+      </p:pic>
       <p:sp>
         <p:nvSpPr>
           <p:cNvPr id="5" name="TextBox 4"/>
@@ -4768,19 +5017,17 @@
         </p:nvSpPr>
         <p:spPr>
           <a:xfrm>
-            <a:off x="914400" y="1645920"/>
-            <a:ext cx="7315200" cy="3657600"/>
+            <a:off x="0" y="0"/>
+            <a:ext cx="9144000" cy="228600"/>
           </a:xfrm>
           <a:prstGeom prst="rect">
             <a:avLst/>
           </a:prstGeom>
           <a:solidFill>
-            <a:srgbClr val="E6E6E6"/>
+            <a:srgbClr val="0F6CBD"/>
           </a:solidFill>
           <a:ln>
-            <a:solidFill>
-              <a:srgbClr val="787878"/>
-            </a:solidFill>
+            <a:noFill/>
           </a:ln>
         </p:spPr>
         <p:style>
@@ -4805,37 +5052,30 @@
           </a:p>
         </p:txBody>
       </p:sp>
-      <p:sp>
-        <p:nvSpPr>
-          <p:cNvPr id="4" name="TextBox 3"/>
-          <p:cNvSpPr txBox="1"/>
+      <p:pic>
+        <p:nvPicPr>
+          <p:cNvPr id="4" name="Picture 3" descr="docker_ps.png"/>
+          <p:cNvPicPr>
+            <a:picLocks noChangeAspect="1"/>
+          </p:cNvPicPr>
           <p:nvPr/>
-        </p:nvSpPr>
+        </p:nvPicPr>
+        <p:blipFill>
+          <a:blip r:embed="rId2"/>
+          <a:stretch>
+            <a:fillRect/>
+          </a:stretch>
+        </p:blipFill>
         <p:spPr>
           <a:xfrm>
-            <a:off x="1097280" y="1828800"/>
-            <a:ext cx="6949440" cy="914400"/>
+            <a:off x="914400" y="1371600"/>
+            <a:ext cx="7315200" cy="4114800"/>
           </a:xfrm>
           <a:prstGeom prst="rect">
             <a:avLst/>
           </a:prstGeom>
-          <a:noFill/>
         </p:spPr>
-        <p:txBody>
-          <a:bodyPr wrap="none">
-            <a:spAutoFit/>
-          </a:bodyPr>
-          <a:lstStyle/>
-          <a:p>
-            <a:pPr algn="ctr">
-              <a:defRPr sz="1600"/>
-            </a:pPr>
-            <a:r>
-              <a:t>Place 'docker ps' screenshot showing simple-webapp-demo here</a:t>
-            </a:r>
-          </a:p>
-        </p:txBody>
-      </p:sp>
+      </p:pic>
       <p:sp>
         <p:nvSpPr>
           <p:cNvPr id="5" name="TextBox 4"/>
@@ -4933,19 +5173,17 @@
         </p:nvSpPr>
         <p:spPr>
           <a:xfrm>
-            <a:off x="914400" y="1645920"/>
-            <a:ext cx="7315200" cy="3657600"/>
+            <a:off x="0" y="0"/>
+            <a:ext cx="9144000" cy="228600"/>
           </a:xfrm>
           <a:prstGeom prst="rect">
             <a:avLst/>
           </a:prstGeom>
           <a:solidFill>
-            <a:srgbClr val="E6E6E6"/>
+            <a:srgbClr val="0F6CBD"/>
           </a:solidFill>
           <a:ln>
-            <a:solidFill>
-              <a:srgbClr val="787878"/>
-            </a:solidFill>
+            <a:noFill/>
           </a:ln>
         </p:spPr>
         <p:style>
@@ -4970,37 +5208,30 @@
           </a:p>
         </p:txBody>
       </p:sp>
-      <p:sp>
-        <p:nvSpPr>
-          <p:cNvPr id="4" name="TextBox 3"/>
-          <p:cNvSpPr txBox="1"/>
+      <p:pic>
+        <p:nvPicPr>
+          <p:cNvPr id="4" name="Picture 3" descr="app_browser.png"/>
+          <p:cNvPicPr>
+            <a:picLocks noChangeAspect="1"/>
+          </p:cNvPicPr>
           <p:nvPr/>
-        </p:nvSpPr>
+        </p:nvPicPr>
+        <p:blipFill>
+          <a:blip r:embed="rId2"/>
+          <a:stretch>
+            <a:fillRect/>
+          </a:stretch>
+        </p:blipFill>
         <p:spPr>
           <a:xfrm>
-            <a:off x="1097280" y="1828800"/>
-            <a:ext cx="6949440" cy="914400"/>
+            <a:off x="914400" y="1371600"/>
+            <a:ext cx="7315200" cy="4114800"/>
           </a:xfrm>
           <a:prstGeom prst="rect">
             <a:avLst/>
           </a:prstGeom>
-          <a:noFill/>
         </p:spPr>
-        <p:txBody>
-          <a:bodyPr wrap="none">
-            <a:spAutoFit/>
-          </a:bodyPr>
-          <a:lstStyle/>
-          <a:p>
-            <a:pPr algn="ctr">
-              <a:defRPr sz="1600"/>
-            </a:pPr>
-            <a:r>
-              <a:t>Place browser screenshot with JS alert here</a:t>
-            </a:r>
-          </a:p>
-        </p:txBody>
-      </p:sp>
+      </p:pic>
       <p:sp>
         <p:nvSpPr>
           <p:cNvPr id="5" name="TextBox 4"/>
@@ -5132,7 +5363,50 @@
       </p:sp>
       <p:sp>
         <p:nvSpPr>
-          <p:cNvPr id="4" name="TextBox 3"/>
+          <p:cNvPr id="4" name="Rectangle 3"/>
+          <p:cNvSpPr/>
+          <p:nvPr/>
+        </p:nvSpPr>
+        <p:spPr>
+          <a:xfrm>
+            <a:off x="0" y="0"/>
+            <a:ext cx="9144000" cy="228600"/>
+          </a:xfrm>
+          <a:prstGeom prst="rect">
+            <a:avLst/>
+          </a:prstGeom>
+          <a:solidFill>
+            <a:srgbClr val="0F6CBD"/>
+          </a:solidFill>
+          <a:ln>
+            <a:noFill/>
+          </a:ln>
+        </p:spPr>
+        <p:style>
+          <a:lnRef idx="1">
+            <a:schemeClr val="accent1"/>
+          </a:lnRef>
+          <a:fillRef idx="3">
+            <a:schemeClr val="accent1"/>
+          </a:fillRef>
+          <a:effectRef idx="2">
+            <a:schemeClr val="accent1"/>
+          </a:effectRef>
+          <a:fontRef idx="minor">
+            <a:schemeClr val="lt1"/>
+          </a:fontRef>
+        </p:style>
+        <p:txBody>
+          <a:bodyPr rtlCol="0" anchor="ctr"/>
+          <a:lstStyle/>
+          <a:p>
+            <a:pPr algn="ctr"/>
+          </a:p>
+        </p:txBody>
+      </p:sp>
+      <p:sp>
+        <p:nvSpPr>
+          <p:cNvPr id="5" name="TextBox 4"/>
           <p:cNvSpPr txBox="1"/>
           <p:nvPr/>
         </p:nvSpPr>
@@ -5285,7 +5559,50 @@
       </p:sp>
       <p:sp>
         <p:nvSpPr>
-          <p:cNvPr id="4" name="TextBox 3"/>
+          <p:cNvPr id="4" name="Rectangle 3"/>
+          <p:cNvSpPr/>
+          <p:nvPr/>
+        </p:nvSpPr>
+        <p:spPr>
+          <a:xfrm>
+            <a:off x="0" y="0"/>
+            <a:ext cx="9144000" cy="228600"/>
+          </a:xfrm>
+          <a:prstGeom prst="rect">
+            <a:avLst/>
+          </a:prstGeom>
+          <a:solidFill>
+            <a:srgbClr val="0F6CBD"/>
+          </a:solidFill>
+          <a:ln>
+            <a:noFill/>
+          </a:ln>
+        </p:spPr>
+        <p:style>
+          <a:lnRef idx="1">
+            <a:schemeClr val="accent1"/>
+          </a:lnRef>
+          <a:fillRef idx="3">
+            <a:schemeClr val="accent1"/>
+          </a:fillRef>
+          <a:effectRef idx="2">
+            <a:schemeClr val="accent1"/>
+          </a:effectRef>
+          <a:fontRef idx="minor">
+            <a:schemeClr val="lt1"/>
+          </a:fontRef>
+        </p:style>
+        <p:txBody>
+          <a:bodyPr rtlCol="0" anchor="ctr"/>
+          <a:lstStyle/>
+          <a:p>
+            <a:pPr algn="ctr"/>
+          </a:p>
+        </p:txBody>
+      </p:sp>
+      <p:sp>
+        <p:nvSpPr>
+          <p:cNvPr id="5" name="TextBox 4"/>
           <p:cNvSpPr txBox="1"/>
           <p:nvPr/>
         </p:nvSpPr>
@@ -5438,7 +5755,50 @@
       </p:sp>
       <p:sp>
         <p:nvSpPr>
-          <p:cNvPr id="4" name="TextBox 3"/>
+          <p:cNvPr id="4" name="Rectangle 3"/>
+          <p:cNvSpPr/>
+          <p:nvPr/>
+        </p:nvSpPr>
+        <p:spPr>
+          <a:xfrm>
+            <a:off x="0" y="0"/>
+            <a:ext cx="9144000" cy="228600"/>
+          </a:xfrm>
+          <a:prstGeom prst="rect">
+            <a:avLst/>
+          </a:prstGeom>
+          <a:solidFill>
+            <a:srgbClr val="0F6CBD"/>
+          </a:solidFill>
+          <a:ln>
+            <a:noFill/>
+          </a:ln>
+        </p:spPr>
+        <p:style>
+          <a:lnRef idx="1">
+            <a:schemeClr val="accent1"/>
+          </a:lnRef>
+          <a:fillRef idx="3">
+            <a:schemeClr val="accent1"/>
+          </a:fillRef>
+          <a:effectRef idx="2">
+            <a:schemeClr val="accent1"/>
+          </a:effectRef>
+          <a:fontRef idx="minor">
+            <a:schemeClr val="lt1"/>
+          </a:fontRef>
+        </p:style>
+        <p:txBody>
+          <a:bodyPr rtlCol="0" anchor="ctr"/>
+          <a:lstStyle/>
+          <a:p>
+            <a:pPr algn="ctr"/>
+          </a:p>
+        </p:txBody>
+      </p:sp>
+      <p:sp>
+        <p:nvSpPr>
+          <p:cNvPr id="5" name="TextBox 4"/>
           <p:cNvSpPr txBox="1"/>
           <p:nvPr/>
         </p:nvSpPr>
@@ -5579,7 +5939,50 @@
       </p:sp>
       <p:sp>
         <p:nvSpPr>
-          <p:cNvPr id="4" name="TextBox 3"/>
+          <p:cNvPr id="4" name="Rectangle 3"/>
+          <p:cNvSpPr/>
+          <p:nvPr/>
+        </p:nvSpPr>
+        <p:spPr>
+          <a:xfrm>
+            <a:off x="0" y="0"/>
+            <a:ext cx="9144000" cy="228600"/>
+          </a:xfrm>
+          <a:prstGeom prst="rect">
+            <a:avLst/>
+          </a:prstGeom>
+          <a:solidFill>
+            <a:srgbClr val="0F6CBD"/>
+          </a:solidFill>
+          <a:ln>
+            <a:noFill/>
+          </a:ln>
+        </p:spPr>
+        <p:style>
+          <a:lnRef idx="1">
+            <a:schemeClr val="accent1"/>
+          </a:lnRef>
+          <a:fillRef idx="3">
+            <a:schemeClr val="accent1"/>
+          </a:fillRef>
+          <a:effectRef idx="2">
+            <a:schemeClr val="accent1"/>
+          </a:effectRef>
+          <a:fontRef idx="minor">
+            <a:schemeClr val="lt1"/>
+          </a:fontRef>
+        </p:style>
+        <p:txBody>
+          <a:bodyPr rtlCol="0" anchor="ctr"/>
+          <a:lstStyle/>
+          <a:p>
+            <a:pPr algn="ctr"/>
+          </a:p>
+        </p:txBody>
+      </p:sp>
+      <p:sp>
+        <p:nvSpPr>
+          <p:cNvPr id="5" name="TextBox 4"/>
           <p:cNvSpPr txBox="1"/>
           <p:nvPr/>
         </p:nvSpPr>
@@ -5744,7 +6147,50 @@
       </p:sp>
       <p:sp>
         <p:nvSpPr>
-          <p:cNvPr id="4" name="TextBox 3"/>
+          <p:cNvPr id="4" name="Rectangle 3"/>
+          <p:cNvSpPr/>
+          <p:nvPr/>
+        </p:nvSpPr>
+        <p:spPr>
+          <a:xfrm>
+            <a:off x="0" y="0"/>
+            <a:ext cx="9144000" cy="228600"/>
+          </a:xfrm>
+          <a:prstGeom prst="rect">
+            <a:avLst/>
+          </a:prstGeom>
+          <a:solidFill>
+            <a:srgbClr val="0F6CBD"/>
+          </a:solidFill>
+          <a:ln>
+            <a:noFill/>
+          </a:ln>
+        </p:spPr>
+        <p:style>
+          <a:lnRef idx="1">
+            <a:schemeClr val="accent1"/>
+          </a:lnRef>
+          <a:fillRef idx="3">
+            <a:schemeClr val="accent1"/>
+          </a:fillRef>
+          <a:effectRef idx="2">
+            <a:schemeClr val="accent1"/>
+          </a:effectRef>
+          <a:fontRef idx="minor">
+            <a:schemeClr val="lt1"/>
+          </a:fontRef>
+        </p:style>
+        <p:txBody>
+          <a:bodyPr rtlCol="0" anchor="ctr"/>
+          <a:lstStyle/>
+          <a:p>
+            <a:pPr algn="ctr"/>
+          </a:p>
+        </p:txBody>
+      </p:sp>
+      <p:sp>
+        <p:nvSpPr>
+          <p:cNvPr id="5" name="TextBox 4"/>
           <p:cNvSpPr txBox="1"/>
           <p:nvPr/>
         </p:nvSpPr>
@@ -5897,7 +6343,50 @@
       </p:sp>
       <p:sp>
         <p:nvSpPr>
-          <p:cNvPr id="4" name="TextBox 3"/>
+          <p:cNvPr id="4" name="Rectangle 3"/>
+          <p:cNvSpPr/>
+          <p:nvPr/>
+        </p:nvSpPr>
+        <p:spPr>
+          <a:xfrm>
+            <a:off x="0" y="0"/>
+            <a:ext cx="9144000" cy="228600"/>
+          </a:xfrm>
+          <a:prstGeom prst="rect">
+            <a:avLst/>
+          </a:prstGeom>
+          <a:solidFill>
+            <a:srgbClr val="0F6CBD"/>
+          </a:solidFill>
+          <a:ln>
+            <a:noFill/>
+          </a:ln>
+        </p:spPr>
+        <p:style>
+          <a:lnRef idx="1">
+            <a:schemeClr val="accent1"/>
+          </a:lnRef>
+          <a:fillRef idx="3">
+            <a:schemeClr val="accent1"/>
+          </a:fillRef>
+          <a:effectRef idx="2">
+            <a:schemeClr val="accent1"/>
+          </a:effectRef>
+          <a:fontRef idx="minor">
+            <a:schemeClr val="lt1"/>
+          </a:fontRef>
+        </p:style>
+        <p:txBody>
+          <a:bodyPr rtlCol="0" anchor="ctr"/>
+          <a:lstStyle/>
+          <a:p>
+            <a:pPr algn="ctr"/>
+          </a:p>
+        </p:txBody>
+      </p:sp>
+      <p:sp>
+        <p:nvSpPr>
+          <p:cNvPr id="5" name="TextBox 4"/>
           <p:cNvSpPr txBox="1"/>
           <p:nvPr/>
         </p:nvSpPr>
@@ -6062,7 +6551,50 @@
       </p:sp>
       <p:sp>
         <p:nvSpPr>
-          <p:cNvPr id="4" name="TextBox 3"/>
+          <p:cNvPr id="4" name="Rectangle 3"/>
+          <p:cNvSpPr/>
+          <p:nvPr/>
+        </p:nvSpPr>
+        <p:spPr>
+          <a:xfrm>
+            <a:off x="0" y="0"/>
+            <a:ext cx="9144000" cy="228600"/>
+          </a:xfrm>
+          <a:prstGeom prst="rect">
+            <a:avLst/>
+          </a:prstGeom>
+          <a:solidFill>
+            <a:srgbClr val="0F6CBD"/>
+          </a:solidFill>
+          <a:ln>
+            <a:noFill/>
+          </a:ln>
+        </p:spPr>
+        <p:style>
+          <a:lnRef idx="1">
+            <a:schemeClr val="accent1"/>
+          </a:lnRef>
+          <a:fillRef idx="3">
+            <a:schemeClr val="accent1"/>
+          </a:fillRef>
+          <a:effectRef idx="2">
+            <a:schemeClr val="accent1"/>
+          </a:effectRef>
+          <a:fontRef idx="minor">
+            <a:schemeClr val="lt1"/>
+          </a:fontRef>
+        </p:style>
+        <p:txBody>
+          <a:bodyPr rtlCol="0" anchor="ctr"/>
+          <a:lstStyle/>
+          <a:p>
+            <a:pPr algn="ctr"/>
+          </a:p>
+        </p:txBody>
+      </p:sp>
+      <p:sp>
+        <p:nvSpPr>
+          <p:cNvPr id="5" name="TextBox 4"/>
           <p:cNvSpPr txBox="1"/>
           <p:nvPr/>
         </p:nvSpPr>
@@ -6203,7 +6735,50 @@
       </p:sp>
       <p:sp>
         <p:nvSpPr>
-          <p:cNvPr id="4" name="TextBox 3"/>
+          <p:cNvPr id="4" name="Rectangle 3"/>
+          <p:cNvSpPr/>
+          <p:nvPr/>
+        </p:nvSpPr>
+        <p:spPr>
+          <a:xfrm>
+            <a:off x="0" y="0"/>
+            <a:ext cx="9144000" cy="228600"/>
+          </a:xfrm>
+          <a:prstGeom prst="rect">
+            <a:avLst/>
+          </a:prstGeom>
+          <a:solidFill>
+            <a:srgbClr val="0F6CBD"/>
+          </a:solidFill>
+          <a:ln>
+            <a:noFill/>
+          </a:ln>
+        </p:spPr>
+        <p:style>
+          <a:lnRef idx="1">
+            <a:schemeClr val="accent1"/>
+          </a:lnRef>
+          <a:fillRef idx="3">
+            <a:schemeClr val="accent1"/>
+          </a:fillRef>
+          <a:effectRef idx="2">
+            <a:schemeClr val="accent1"/>
+          </a:effectRef>
+          <a:fontRef idx="minor">
+            <a:schemeClr val="lt1"/>
+          </a:fontRef>
+        </p:style>
+        <p:txBody>
+          <a:bodyPr rtlCol="0" anchor="ctr"/>
+          <a:lstStyle/>
+          <a:p>
+            <a:pPr algn="ctr"/>
+          </a:p>
+        </p:txBody>
+      </p:sp>
+      <p:sp>
+        <p:nvSpPr>
+          <p:cNvPr id="5" name="TextBox 4"/>
           <p:cNvSpPr txBox="1"/>
           <p:nvPr/>
         </p:nvSpPr>
@@ -6356,7 +6931,50 @@
       </p:sp>
       <p:sp>
         <p:nvSpPr>
-          <p:cNvPr id="4" name="TextBox 3"/>
+          <p:cNvPr id="4" name="Rectangle 3"/>
+          <p:cNvSpPr/>
+          <p:nvPr/>
+        </p:nvSpPr>
+        <p:spPr>
+          <a:xfrm>
+            <a:off x="0" y="0"/>
+            <a:ext cx="9144000" cy="228600"/>
+          </a:xfrm>
+          <a:prstGeom prst="rect">
+            <a:avLst/>
+          </a:prstGeom>
+          <a:solidFill>
+            <a:srgbClr val="0F6CBD"/>
+          </a:solidFill>
+          <a:ln>
+            <a:noFill/>
+          </a:ln>
+        </p:spPr>
+        <p:style>
+          <a:lnRef idx="1">
+            <a:schemeClr val="accent1"/>
+          </a:lnRef>
+          <a:fillRef idx="3">
+            <a:schemeClr val="accent1"/>
+          </a:fillRef>
+          <a:effectRef idx="2">
+            <a:schemeClr val="accent1"/>
+          </a:effectRef>
+          <a:fontRef idx="minor">
+            <a:schemeClr val="lt1"/>
+          </a:fontRef>
+        </p:style>
+        <p:txBody>
+          <a:bodyPr rtlCol="0" anchor="ctr"/>
+          <a:lstStyle/>
+          <a:p>
+            <a:pPr algn="ctr"/>
+          </a:p>
+        </p:txBody>
+      </p:sp>
+      <p:sp>
+        <p:nvSpPr>
+          <p:cNvPr id="5" name="TextBox 4"/>
           <p:cNvSpPr txBox="1"/>
           <p:nvPr/>
         </p:nvSpPr>

</xml_diff>